<commit_message>
added files for heroku deployment
</commit_message>
<xml_diff>
--- a/documents/P7_03_présentation.pptx
+++ b/documents/P7_03_présentation.pptx
@@ -5,18 +5,17 @@
     <p:sldMasterId id="2147483648" r:id="rId1"/>
   </p:sldMasterIdLst>
   <p:notesMasterIdLst>
-    <p:notesMasterId r:id="rId11"/>
+    <p:notesMasterId r:id="rId10"/>
   </p:notesMasterIdLst>
   <p:sldIdLst>
     <p:sldId id="256" r:id="rId2"/>
-    <p:sldId id="261" r:id="rId3"/>
-    <p:sldId id="262" r:id="rId4"/>
+    <p:sldId id="262" r:id="rId3"/>
+    <p:sldId id="261" r:id="rId4"/>
     <p:sldId id="263" r:id="rId5"/>
     <p:sldId id="277" r:id="rId6"/>
     <p:sldId id="266" r:id="rId7"/>
     <p:sldId id="275" r:id="rId8"/>
     <p:sldId id="269" r:id="rId9"/>
-    <p:sldId id="276" r:id="rId10"/>
   </p:sldIdLst>
   <p:sldSz cx="12192000" cy="6858000"/>
   <p:notesSz cx="6858000" cy="9144000"/>
@@ -2929,7 +2928,7 @@
           <a:p>
             <a:fld id="{13330C40-D419-4EE2-8AAA-0DB43A912EEE}" type="datetimeFigureOut">
               <a:rPr lang="en-CA" smtClean="0"/>
-              <a:t>2021-10-16</a:t>
+              <a:t>2021-10-17</a:t>
             </a:fld>
             <a:endParaRPr lang="en-CA"/>
           </a:p>
@@ -3271,7 +3270,7 @@
     </p:spTree>
     <p:extLst>
       <p:ext uri="{BB962C8B-B14F-4D97-AF65-F5344CB8AC3E}">
-        <p14:creationId xmlns:p14="http://schemas.microsoft.com/office/powerpoint/2010/main" val="692100049"/>
+        <p14:creationId xmlns:p14="http://schemas.microsoft.com/office/powerpoint/2010/main" val="1248166988"/>
       </p:ext>
     </p:extLst>
   </p:cSld>
@@ -3355,7 +3354,7 @@
     </p:spTree>
     <p:extLst>
       <p:ext uri="{BB962C8B-B14F-4D97-AF65-F5344CB8AC3E}">
-        <p14:creationId xmlns:p14="http://schemas.microsoft.com/office/powerpoint/2010/main" val="1248166988"/>
+        <p14:creationId xmlns:p14="http://schemas.microsoft.com/office/powerpoint/2010/main" val="692100049"/>
       </p:ext>
     </p:extLst>
   </p:cSld>
@@ -3832,7 +3831,7 @@
           <a:p>
             <a:fld id="{FAD47613-319A-4C96-8454-D139E600B4EE}" type="datetimeFigureOut">
               <a:rPr lang="en-CA" smtClean="0"/>
-              <a:t>2021-10-16</a:t>
+              <a:t>2021-10-17</a:t>
             </a:fld>
             <a:endParaRPr lang="en-CA"/>
           </a:p>
@@ -4032,7 +4031,7 @@
           <a:p>
             <a:fld id="{FAD47613-319A-4C96-8454-D139E600B4EE}" type="datetimeFigureOut">
               <a:rPr lang="en-CA" smtClean="0"/>
-              <a:t>2021-10-16</a:t>
+              <a:t>2021-10-17</a:t>
             </a:fld>
             <a:endParaRPr lang="en-CA"/>
           </a:p>
@@ -4242,7 +4241,7 @@
           <a:p>
             <a:fld id="{FAD47613-319A-4C96-8454-D139E600B4EE}" type="datetimeFigureOut">
               <a:rPr lang="en-CA" smtClean="0"/>
-              <a:t>2021-10-16</a:t>
+              <a:t>2021-10-17</a:t>
             </a:fld>
             <a:endParaRPr lang="en-CA"/>
           </a:p>
@@ -4442,7 +4441,7 @@
           <a:p>
             <a:fld id="{FAD47613-319A-4C96-8454-D139E600B4EE}" type="datetimeFigureOut">
               <a:rPr lang="en-CA" smtClean="0"/>
-              <a:t>2021-10-16</a:t>
+              <a:t>2021-10-17</a:t>
             </a:fld>
             <a:endParaRPr lang="en-CA"/>
           </a:p>
@@ -4718,7 +4717,7 @@
           <a:p>
             <a:fld id="{FAD47613-319A-4C96-8454-D139E600B4EE}" type="datetimeFigureOut">
               <a:rPr lang="en-CA" smtClean="0"/>
-              <a:t>2021-10-16</a:t>
+              <a:t>2021-10-17</a:t>
             </a:fld>
             <a:endParaRPr lang="en-CA"/>
           </a:p>
@@ -4986,7 +4985,7 @@
           <a:p>
             <a:fld id="{FAD47613-319A-4C96-8454-D139E600B4EE}" type="datetimeFigureOut">
               <a:rPr lang="en-CA" smtClean="0"/>
-              <a:t>2021-10-16</a:t>
+              <a:t>2021-10-17</a:t>
             </a:fld>
             <a:endParaRPr lang="en-CA"/>
           </a:p>
@@ -5401,7 +5400,7 @@
           <a:p>
             <a:fld id="{FAD47613-319A-4C96-8454-D139E600B4EE}" type="datetimeFigureOut">
               <a:rPr lang="en-CA" smtClean="0"/>
-              <a:t>2021-10-16</a:t>
+              <a:t>2021-10-17</a:t>
             </a:fld>
             <a:endParaRPr lang="en-CA"/>
           </a:p>
@@ -5543,7 +5542,7 @@
           <a:p>
             <a:fld id="{FAD47613-319A-4C96-8454-D139E600B4EE}" type="datetimeFigureOut">
               <a:rPr lang="en-CA" smtClean="0"/>
-              <a:t>2021-10-16</a:t>
+              <a:t>2021-10-17</a:t>
             </a:fld>
             <a:endParaRPr lang="en-CA"/>
           </a:p>
@@ -5656,7 +5655,7 @@
           <a:p>
             <a:fld id="{FAD47613-319A-4C96-8454-D139E600B4EE}" type="datetimeFigureOut">
               <a:rPr lang="en-CA" smtClean="0"/>
-              <a:t>2021-10-16</a:t>
+              <a:t>2021-10-17</a:t>
             </a:fld>
             <a:endParaRPr lang="en-CA"/>
           </a:p>
@@ -5969,7 +5968,7 @@
           <a:p>
             <a:fld id="{FAD47613-319A-4C96-8454-D139E600B4EE}" type="datetimeFigureOut">
               <a:rPr lang="en-CA" smtClean="0"/>
-              <a:t>2021-10-16</a:t>
+              <a:t>2021-10-17</a:t>
             </a:fld>
             <a:endParaRPr lang="en-CA"/>
           </a:p>
@@ -6258,7 +6257,7 @@
           <a:p>
             <a:fld id="{FAD47613-319A-4C96-8454-D139E600B4EE}" type="datetimeFigureOut">
               <a:rPr lang="en-CA" smtClean="0"/>
-              <a:t>2021-10-16</a:t>
+              <a:t>2021-10-17</a:t>
             </a:fld>
             <a:endParaRPr lang="en-CA"/>
           </a:p>
@@ -6501,7 +6500,7 @@
           <a:p>
             <a:fld id="{FAD47613-319A-4C96-8454-D139E600B4EE}" type="datetimeFigureOut">
               <a:rPr lang="en-CA" smtClean="0"/>
-              <a:t>2021-10-16</a:t>
+              <a:t>2021-10-17</a:t>
             </a:fld>
             <a:endParaRPr lang="en-CA"/>
           </a:p>
@@ -8216,6 +8215,494 @@
       </p:grpSpPr>
       <p:sp>
         <p:nvSpPr>
+          <p:cNvPr id="10" name="Rectangle 9">
+            <a:extLst>
+              <a:ext uri="{FF2B5EF4-FFF2-40B4-BE49-F238E27FC236}">
+                <a16:creationId xmlns:a16="http://schemas.microsoft.com/office/drawing/2014/main" id="{2B566528-1B12-4246-9431-5C2D7D081168}"/>
+              </a:ext>
+              <a:ext uri="{C183D7F6-B498-43B3-948B-1728B52AA6E4}">
+                <adec:decorative xmlns:adec="http://schemas.microsoft.com/office/drawing/2017/decorative" val="1"/>
+              </a:ext>
+            </a:extLst>
+          </p:cNvPr>
+          <p:cNvSpPr>
+            <a:spLocks noGrp="1" noRot="1" noChangeAspect="1" noMove="1" noResize="1" noEditPoints="1" noAdjustHandles="1" noChangeArrowheads="1" noChangeShapeType="1" noTextEdit="1"/>
+          </p:cNvSpPr>
+          <p:nvPr>
+            <p:extLst>
+              <p:ext uri="{386F3935-93C4-4BCD-93E2-E3B085C9AB24}">
+                <p16:designElem xmlns:p16="http://schemas.microsoft.com/office/powerpoint/2015/main" val="1"/>
+              </p:ext>
+            </p:extLst>
+          </p:nvPr>
+        </p:nvSpPr>
+        <p:spPr>
+          <a:xfrm>
+            <a:off x="0" y="0"/>
+            <a:ext cx="12192000" cy="6858000"/>
+          </a:xfrm>
+          <a:prstGeom prst="rect">
+            <a:avLst/>
+          </a:prstGeom>
+          <a:solidFill>
+            <a:schemeClr val="bg1"/>
+          </a:solidFill>
+          <a:ln>
+            <a:noFill/>
+          </a:ln>
+        </p:spPr>
+        <p:style>
+          <a:lnRef idx="2">
+            <a:schemeClr val="accent1">
+              <a:shade val="50000"/>
+            </a:schemeClr>
+          </a:lnRef>
+          <a:fillRef idx="1">
+            <a:schemeClr val="accent1"/>
+          </a:fillRef>
+          <a:effectRef idx="0">
+            <a:schemeClr val="accent1"/>
+          </a:effectRef>
+          <a:fontRef idx="minor">
+            <a:schemeClr val="lt1"/>
+          </a:fontRef>
+        </p:style>
+        <p:txBody>
+          <a:bodyPr rtlCol="0" anchor="ctr"/>
+          <a:lstStyle/>
+          <a:p>
+            <a:pPr algn="ctr"/>
+            <a:endParaRPr lang="en-US" dirty="0"/>
+          </a:p>
+        </p:txBody>
+      </p:sp>
+      <p:sp>
+        <p:nvSpPr>
+          <p:cNvPr id="2" name="Title 1">
+            <a:extLst>
+              <a:ext uri="{FF2B5EF4-FFF2-40B4-BE49-F238E27FC236}">
+                <a16:creationId xmlns:a16="http://schemas.microsoft.com/office/drawing/2014/main" id="{FED8B387-E483-43B2-9D79-AAEE77CD6668}"/>
+              </a:ext>
+            </a:extLst>
+          </p:cNvPr>
+          <p:cNvSpPr>
+            <a:spLocks noGrp="1"/>
+          </p:cNvSpPr>
+          <p:nvPr>
+            <p:ph type="title"/>
+          </p:nvPr>
+        </p:nvSpPr>
+        <p:spPr>
+          <a:xfrm>
+            <a:off x="643467" y="321734"/>
+            <a:ext cx="10905066" cy="1135737"/>
+          </a:xfrm>
+        </p:spPr>
+        <p:txBody>
+          <a:bodyPr>
+            <a:normAutofit/>
+          </a:bodyPr>
+          <a:lstStyle/>
+          <a:p>
+            <a:r>
+              <a:rPr lang="fr-CA" sz="3600"/>
+              <a:t>Sommaire</a:t>
+            </a:r>
+          </a:p>
+        </p:txBody>
+      </p:sp>
+      <p:sp>
+        <p:nvSpPr>
+          <p:cNvPr id="3" name="Content Placeholder 2">
+            <a:extLst>
+              <a:ext uri="{FF2B5EF4-FFF2-40B4-BE49-F238E27FC236}">
+                <a16:creationId xmlns:a16="http://schemas.microsoft.com/office/drawing/2014/main" id="{95475A0D-95DA-4FE4-8713-647F686F1EB6}"/>
+              </a:ext>
+            </a:extLst>
+          </p:cNvPr>
+          <p:cNvSpPr>
+            <a:spLocks noGrp="1"/>
+          </p:cNvSpPr>
+          <p:nvPr>
+            <p:ph idx="1"/>
+          </p:nvPr>
+        </p:nvSpPr>
+        <p:spPr>
+          <a:xfrm>
+            <a:off x="643468" y="1457471"/>
+            <a:ext cx="9564221" cy="4719492"/>
+          </a:xfrm>
+        </p:spPr>
+        <p:txBody>
+          <a:bodyPr>
+            <a:normAutofit/>
+          </a:bodyPr>
+          <a:lstStyle/>
+          <a:p>
+            <a:endParaRPr lang="fr-CA" sz="2400" dirty="0"/>
+          </a:p>
+        </p:txBody>
+      </p:sp>
+      <p:grpSp>
+        <p:nvGrpSpPr>
+          <p:cNvPr id="12" name="Group 11">
+            <a:extLst>
+              <a:ext uri="{FF2B5EF4-FFF2-40B4-BE49-F238E27FC236}">
+                <a16:creationId xmlns:a16="http://schemas.microsoft.com/office/drawing/2014/main" id="{828A5161-06F1-46CF-8AD7-844680A59E13}"/>
+              </a:ext>
+              <a:ext uri="{C183D7F6-B498-43B3-948B-1728B52AA6E4}">
+                <adec:decorative xmlns:adec="http://schemas.microsoft.com/office/drawing/2017/decorative" val="1"/>
+              </a:ext>
+            </a:extLst>
+          </p:cNvPr>
+          <p:cNvGrpSpPr>
+            <a:grpSpLocks noGrp="1" noUngrp="1" noRot="1" noChangeAspect="1" noMove="1" noResize="1"/>
+          </p:cNvGrpSpPr>
+          <p:nvPr>
+            <p:extLst>
+              <p:ext uri="{386F3935-93C4-4BCD-93E2-E3B085C9AB24}">
+                <p16:designElem xmlns:p16="http://schemas.microsoft.com/office/powerpoint/2015/main" val="1"/>
+              </p:ext>
+            </p:extLst>
+          </p:nvPr>
+        </p:nvGrpSpPr>
+        <p:grpSpPr>
+          <a:xfrm>
+            <a:off x="0" y="4601497"/>
+            <a:ext cx="1014060" cy="2017580"/>
+            <a:chOff x="0" y="4601497"/>
+            <a:chExt cx="1014060" cy="2017580"/>
+          </a:xfrm>
+        </p:grpSpPr>
+        <p:sp>
+          <p:nvSpPr>
+            <p:cNvPr id="13" name="Isosceles Triangle 12">
+              <a:extLst>
+                <a:ext uri="{FF2B5EF4-FFF2-40B4-BE49-F238E27FC236}">
+                  <a16:creationId xmlns:a16="http://schemas.microsoft.com/office/drawing/2014/main" id="{D3F51FEB-38FB-4F6C-9F7B-2F2AFAB65463}"/>
+                </a:ext>
+                <a:ext uri="{C183D7F6-B498-43B3-948B-1728B52AA6E4}">
+                  <adec:decorative xmlns:adec="http://schemas.microsoft.com/office/drawing/2017/decorative" val="1"/>
+                </a:ext>
+              </a:extLst>
+            </p:cNvPr>
+            <p:cNvSpPr/>
+            <p:nvPr>
+              <p:extLst>
+                <p:ext uri="{386F3935-93C4-4BCD-93E2-E3B085C9AB24}">
+                  <p16:designElem xmlns:p16="http://schemas.microsoft.com/office/powerpoint/2015/main" val="1"/>
+                </p:ext>
+              </p:extLst>
+            </p:nvPr>
+          </p:nvSpPr>
+          <p:spPr>
+            <a:xfrm rot="5400000">
+              <a:off x="-501760" y="5103257"/>
+              <a:ext cx="2017580" cy="1014060"/>
+            </a:xfrm>
+            <a:prstGeom prst="triangle">
+              <a:avLst>
+                <a:gd name="adj" fmla="val 50000"/>
+              </a:avLst>
+            </a:prstGeom>
+            <a:solidFill>
+              <a:schemeClr val="accent1">
+                <a:alpha val="30000"/>
+              </a:schemeClr>
+            </a:solidFill>
+            <a:ln>
+              <a:noFill/>
+            </a:ln>
+          </p:spPr>
+          <p:style>
+            <a:lnRef idx="2">
+              <a:schemeClr val="accent1">
+                <a:shade val="50000"/>
+              </a:schemeClr>
+            </a:lnRef>
+            <a:fillRef idx="1">
+              <a:schemeClr val="accent1"/>
+            </a:fillRef>
+            <a:effectRef idx="0">
+              <a:schemeClr val="accent1"/>
+            </a:effectRef>
+            <a:fontRef idx="minor">
+              <a:schemeClr val="lt1"/>
+            </a:fontRef>
+          </p:style>
+          <p:txBody>
+            <a:bodyPr rtlCol="0" anchor="ctr"/>
+            <a:lstStyle/>
+            <a:p>
+              <a:pPr algn="ctr"/>
+              <a:endParaRPr lang="en-US"/>
+            </a:p>
+          </p:txBody>
+        </p:sp>
+        <p:sp>
+          <p:nvSpPr>
+            <p:cNvPr id="14" name="Rectangle 13">
+              <a:extLst>
+                <a:ext uri="{FF2B5EF4-FFF2-40B4-BE49-F238E27FC236}">
+                  <a16:creationId xmlns:a16="http://schemas.microsoft.com/office/drawing/2014/main" id="{1E547BA6-BAE0-43BB-A7CA-60F69CE252F0}"/>
+                </a:ext>
+                <a:ext uri="{C183D7F6-B498-43B3-948B-1728B52AA6E4}">
+                  <adec:decorative xmlns:adec="http://schemas.microsoft.com/office/drawing/2017/decorative" val="1"/>
+                </a:ext>
+              </a:extLst>
+            </p:cNvPr>
+            <p:cNvSpPr/>
+            <p:nvPr>
+              <p:extLst>
+                <p:ext uri="{386F3935-93C4-4BCD-93E2-E3B085C9AB24}">
+                  <p16:designElem xmlns:p16="http://schemas.microsoft.com/office/powerpoint/2015/main" val="1"/>
+                </p:ext>
+              </p:extLst>
+            </p:nvPr>
+          </p:nvSpPr>
+          <p:spPr>
+            <a:xfrm rot="2700000">
+              <a:off x="427916" y="5728708"/>
+              <a:ext cx="485578" cy="485578"/>
+            </a:xfrm>
+            <a:prstGeom prst="rect">
+              <a:avLst/>
+            </a:prstGeom>
+            <a:solidFill>
+              <a:schemeClr val="accent1">
+                <a:alpha val="30000"/>
+              </a:schemeClr>
+            </a:solidFill>
+            <a:ln>
+              <a:noFill/>
+            </a:ln>
+          </p:spPr>
+          <p:style>
+            <a:lnRef idx="2">
+              <a:schemeClr val="accent1">
+                <a:shade val="50000"/>
+              </a:schemeClr>
+            </a:lnRef>
+            <a:fillRef idx="1">
+              <a:schemeClr val="accent1"/>
+            </a:fillRef>
+            <a:effectRef idx="0">
+              <a:schemeClr val="accent1"/>
+            </a:effectRef>
+            <a:fontRef idx="minor">
+              <a:schemeClr val="lt1"/>
+            </a:fontRef>
+          </p:style>
+          <p:txBody>
+            <a:bodyPr rtlCol="0" anchor="ctr"/>
+            <a:lstStyle/>
+            <a:p>
+              <a:pPr algn="ctr"/>
+              <a:endParaRPr lang="en-US"/>
+            </a:p>
+          </p:txBody>
+        </p:sp>
+      </p:grpSp>
+      <p:grpSp>
+        <p:nvGrpSpPr>
+          <p:cNvPr id="16" name="Group 15">
+            <a:extLst>
+              <a:ext uri="{FF2B5EF4-FFF2-40B4-BE49-F238E27FC236}">
+                <a16:creationId xmlns:a16="http://schemas.microsoft.com/office/drawing/2014/main" id="{5995D10D-E9C9-47DB-AE7E-801FEF38F5C9}"/>
+              </a:ext>
+              <a:ext uri="{C183D7F6-B498-43B3-948B-1728B52AA6E4}">
+                <adec:decorative xmlns:adec="http://schemas.microsoft.com/office/drawing/2017/decorative" val="1"/>
+              </a:ext>
+            </a:extLst>
+          </p:cNvPr>
+          <p:cNvGrpSpPr>
+            <a:grpSpLocks noGrp="1" noUngrp="1" noRot="1" noChangeAspect="1" noMove="1" noResize="1"/>
+          </p:cNvGrpSpPr>
+          <p:nvPr>
+            <p:extLst>
+              <p:ext uri="{386F3935-93C4-4BCD-93E2-E3B085C9AB24}">
+                <p16:designElem xmlns:p16="http://schemas.microsoft.com/office/powerpoint/2015/main" val="1"/>
+              </p:ext>
+            </p:extLst>
+          </p:nvPr>
+        </p:nvGrpSpPr>
+        <p:grpSpPr>
+          <a:xfrm>
+            <a:off x="11219290" y="1"/>
+            <a:ext cx="972709" cy="1935307"/>
+            <a:chOff x="10918968" y="713127"/>
+            <a:chExt cx="1273032" cy="2532832"/>
+          </a:xfrm>
+        </p:grpSpPr>
+        <p:sp>
+          <p:nvSpPr>
+            <p:cNvPr id="17" name="Rectangle 16">
+              <a:extLst>
+                <a:ext uri="{FF2B5EF4-FFF2-40B4-BE49-F238E27FC236}">
+                  <a16:creationId xmlns:a16="http://schemas.microsoft.com/office/drawing/2014/main" id="{CC1A72C6-3DE4-4EC3-9AD5-9E0D40D8CE8A}"/>
+                </a:ext>
+                <a:ext uri="{C183D7F6-B498-43B3-948B-1728B52AA6E4}">
+                  <adec:decorative xmlns:adec="http://schemas.microsoft.com/office/drawing/2017/decorative" val="1"/>
+                </a:ext>
+              </a:extLst>
+            </p:cNvPr>
+            <p:cNvSpPr/>
+            <p:nvPr>
+              <p:extLst>
+                <p:ext uri="{386F3935-93C4-4BCD-93E2-E3B085C9AB24}">
+                  <p16:designElem xmlns:p16="http://schemas.microsoft.com/office/powerpoint/2015/main" val="1"/>
+                </p:ext>
+              </p:extLst>
+            </p:nvPr>
+          </p:nvSpPr>
+          <p:spPr>
+            <a:xfrm rot="2700000">
+              <a:off x="11052629" y="2120024"/>
+              <a:ext cx="645368" cy="645368"/>
+            </a:xfrm>
+            <a:prstGeom prst="rect">
+              <a:avLst/>
+            </a:prstGeom>
+            <a:solidFill>
+              <a:schemeClr val="accent4">
+                <a:alpha val="30000"/>
+              </a:schemeClr>
+            </a:solidFill>
+            <a:ln>
+              <a:noFill/>
+            </a:ln>
+          </p:spPr>
+          <p:style>
+            <a:lnRef idx="2">
+              <a:schemeClr val="accent1">
+                <a:shade val="50000"/>
+              </a:schemeClr>
+            </a:lnRef>
+            <a:fillRef idx="1">
+              <a:schemeClr val="accent1"/>
+            </a:fillRef>
+            <a:effectRef idx="0">
+              <a:schemeClr val="accent1"/>
+            </a:effectRef>
+            <a:fontRef idx="minor">
+              <a:schemeClr val="lt1"/>
+            </a:fontRef>
+          </p:style>
+          <p:txBody>
+            <a:bodyPr rtlCol="0" anchor="ctr"/>
+            <a:lstStyle/>
+            <a:p>
+              <a:pPr algn="ctr"/>
+              <a:endParaRPr lang="en-US"/>
+            </a:p>
+          </p:txBody>
+        </p:sp>
+        <p:sp>
+          <p:nvSpPr>
+            <p:cNvPr id="18" name="Isosceles Triangle 17">
+              <a:extLst>
+                <a:ext uri="{FF2B5EF4-FFF2-40B4-BE49-F238E27FC236}">
+                  <a16:creationId xmlns:a16="http://schemas.microsoft.com/office/drawing/2014/main" id="{0B0DA1F1-C391-4EDF-9FE0-23E86E137765}"/>
+                </a:ext>
+                <a:ext uri="{C183D7F6-B498-43B3-948B-1728B52AA6E4}">
+                  <adec:decorative xmlns:adec="http://schemas.microsoft.com/office/drawing/2017/decorative" val="1"/>
+                </a:ext>
+              </a:extLst>
+            </p:cNvPr>
+            <p:cNvSpPr/>
+            <p:nvPr>
+              <p:extLst>
+                <p:ext uri="{386F3935-93C4-4BCD-93E2-E3B085C9AB24}">
+                  <p16:designElem xmlns:p16="http://schemas.microsoft.com/office/powerpoint/2015/main" val="1"/>
+                </p:ext>
+              </p:extLst>
+            </p:nvPr>
+          </p:nvSpPr>
+          <p:spPr>
+            <a:xfrm rot="16200000">
+              <a:off x="10289068" y="1343027"/>
+              <a:ext cx="2532832" cy="1273032"/>
+            </a:xfrm>
+            <a:prstGeom prst="triangle">
+              <a:avLst>
+                <a:gd name="adj" fmla="val 50000"/>
+              </a:avLst>
+            </a:prstGeom>
+            <a:solidFill>
+              <a:schemeClr val="accent4">
+                <a:alpha val="30000"/>
+              </a:schemeClr>
+            </a:solidFill>
+            <a:ln>
+              <a:noFill/>
+            </a:ln>
+          </p:spPr>
+          <p:style>
+            <a:lnRef idx="2">
+              <a:schemeClr val="accent1">
+                <a:shade val="50000"/>
+              </a:schemeClr>
+            </a:lnRef>
+            <a:fillRef idx="1">
+              <a:schemeClr val="accent1"/>
+            </a:fillRef>
+            <a:effectRef idx="0">
+              <a:schemeClr val="accent1"/>
+            </a:effectRef>
+            <a:fontRef idx="minor">
+              <a:schemeClr val="lt1"/>
+            </a:fontRef>
+          </p:style>
+          <p:txBody>
+            <a:bodyPr rtlCol="0" anchor="ctr"/>
+            <a:lstStyle/>
+            <a:p>
+              <a:pPr algn="ctr"/>
+              <a:endParaRPr lang="en-US" dirty="0"/>
+            </a:p>
+          </p:txBody>
+        </p:sp>
+      </p:grpSp>
+    </p:spTree>
+    <p:extLst>
+      <p:ext uri="{BB962C8B-B14F-4D97-AF65-F5344CB8AC3E}">
+        <p14:creationId xmlns:p14="http://schemas.microsoft.com/office/powerpoint/2010/main" val="2883009267"/>
+      </p:ext>
+    </p:extLst>
+  </p:cSld>
+  <p:clrMapOvr>
+    <a:masterClrMapping/>
+  </p:clrMapOvr>
+</p:sld>
+</file>
+
+<file path=ppt/slides/slide3.xml><?xml version="1.0" encoding="utf-8"?>
+<p:sld xmlns:a="http://schemas.openxmlformats.org/drawingml/2006/main" xmlns:r="http://schemas.openxmlformats.org/officeDocument/2006/relationships" xmlns:p="http://schemas.openxmlformats.org/presentationml/2006/main">
+  <p:cSld>
+    <p:bg>
+      <p:bgPr>
+        <a:solidFill>
+          <a:schemeClr val="bg1"/>
+        </a:solidFill>
+        <a:effectLst/>
+      </p:bgPr>
+    </p:bg>
+    <p:spTree>
+      <p:nvGrpSpPr>
+        <p:cNvPr id="1" name=""/>
+        <p:cNvGrpSpPr/>
+        <p:nvPr/>
+      </p:nvGrpSpPr>
+      <p:grpSpPr>
+        <a:xfrm>
+          <a:off x="0" y="0"/>
+          <a:ext cx="0" cy="0"/>
+          <a:chOff x="0" y="0"/>
+          <a:chExt cx="0" cy="0"/>
+        </a:xfrm>
+      </p:grpSpPr>
+      <p:sp>
+        <p:nvSpPr>
           <p:cNvPr id="15" name="Rectangle 9">
             <a:extLst>
               <a:ext uri="{FF2B5EF4-FFF2-40B4-BE49-F238E27FC236}">
@@ -8770,7 +9257,7 @@
 </p:sld>
 </file>
 
-<file path=ppt/slides/slide3.xml><?xml version="1.0" encoding="utf-8"?>
+<file path=ppt/slides/slide4.xml><?xml version="1.0" encoding="utf-8"?>
 <p:sld xmlns:a="http://schemas.openxmlformats.org/drawingml/2006/main" xmlns:r="http://schemas.openxmlformats.org/officeDocument/2006/relationships" xmlns:p="http://schemas.openxmlformats.org/presentationml/2006/main">
   <p:cSld>
     <p:bg>
@@ -8797,7 +9284,7 @@
       </p:grpSpPr>
       <p:sp>
         <p:nvSpPr>
-          <p:cNvPr id="10" name="Rectangle 9">
+          <p:cNvPr id="9" name="Rectangle 8">
             <a:extLst>
               <a:ext uri="{FF2B5EF4-FFF2-40B4-BE49-F238E27FC236}">
                 <a16:creationId xmlns:a16="http://schemas.microsoft.com/office/drawing/2014/main" id="{2B566528-1B12-4246-9431-5C2D7D081168}"/>
@@ -8887,581 +9374,6 @@
           <a:lstStyle/>
           <a:p>
             <a:r>
-              <a:rPr lang="fr-CA" sz="3600"/>
-              <a:t>Sommaire</a:t>
-            </a:r>
-          </a:p>
-        </p:txBody>
-      </p:sp>
-      <p:sp>
-        <p:nvSpPr>
-          <p:cNvPr id="3" name="Content Placeholder 2">
-            <a:extLst>
-              <a:ext uri="{FF2B5EF4-FFF2-40B4-BE49-F238E27FC236}">
-                <a16:creationId xmlns:a16="http://schemas.microsoft.com/office/drawing/2014/main" id="{95475A0D-95DA-4FE4-8713-647F686F1EB6}"/>
-              </a:ext>
-            </a:extLst>
-          </p:cNvPr>
-          <p:cNvSpPr>
-            <a:spLocks noGrp="1"/>
-          </p:cNvSpPr>
-          <p:nvPr>
-            <p:ph idx="1"/>
-          </p:nvPr>
-        </p:nvSpPr>
-        <p:spPr>
-          <a:xfrm>
-            <a:off x="643468" y="1457471"/>
-            <a:ext cx="9564221" cy="4719492"/>
-          </a:xfrm>
-        </p:spPr>
-        <p:txBody>
-          <a:bodyPr>
-            <a:normAutofit/>
-          </a:bodyPr>
-          <a:lstStyle/>
-          <a:p>
-            <a:r>
-              <a:rPr lang="fr-CA" sz="2400" dirty="0"/>
-              <a:t>Exploration et analyse des données</a:t>
-            </a:r>
-          </a:p>
-          <a:p>
-            <a:r>
-              <a:rPr lang="fr-CA" sz="2400" dirty="0"/>
-              <a:t>Approche NLP</a:t>
-            </a:r>
-          </a:p>
-          <a:p>
-            <a:pPr lvl="1"/>
-            <a:r>
-              <a:rPr lang="fr-CA" dirty="0"/>
-              <a:t>Pré-traitement</a:t>
-            </a:r>
-          </a:p>
-          <a:p>
-            <a:pPr lvl="1"/>
-            <a:r>
-              <a:rPr lang="fr-CA" dirty="0"/>
-              <a:t>Résultat modèle non supervisé</a:t>
-            </a:r>
-          </a:p>
-          <a:p>
-            <a:pPr lvl="1"/>
-            <a:r>
-              <a:rPr lang="fr-CA" dirty="0"/>
-              <a:t>Résultat modèle supervisé</a:t>
-            </a:r>
-          </a:p>
-          <a:p>
-            <a:r>
-              <a:rPr lang="fr-CA" sz="2400" dirty="0"/>
-              <a:t>Approche computer vision</a:t>
-            </a:r>
-          </a:p>
-          <a:p>
-            <a:pPr lvl="1"/>
-            <a:r>
-              <a:rPr lang="fr-CA" dirty="0" err="1"/>
-              <a:t>Sift</a:t>
-            </a:r>
-            <a:r>
-              <a:rPr lang="fr-CA" dirty="0"/>
-              <a:t> + bag of </a:t>
-            </a:r>
-            <a:r>
-              <a:rPr lang="fr-CA" dirty="0" err="1"/>
-              <a:t>visual</a:t>
-            </a:r>
-            <a:r>
-              <a:rPr lang="fr-CA" dirty="0"/>
-              <a:t> </a:t>
-            </a:r>
-            <a:r>
-              <a:rPr lang="fr-CA" dirty="0" err="1"/>
-              <a:t>words</a:t>
-            </a:r>
-            <a:endParaRPr lang="fr-CA" dirty="0"/>
-          </a:p>
-          <a:p>
-            <a:pPr lvl="1"/>
-            <a:r>
-              <a:rPr lang="fr-CA" dirty="0"/>
-              <a:t>CNN avec </a:t>
-            </a:r>
-            <a:r>
-              <a:rPr lang="fr-CA" dirty="0" err="1"/>
-              <a:t>Keras</a:t>
-            </a:r>
-            <a:r>
-              <a:rPr lang="fr-CA" dirty="0"/>
-              <a:t> + VGG16</a:t>
-            </a:r>
-          </a:p>
-          <a:p>
-            <a:r>
-              <a:rPr lang="fr-CA" sz="2400" dirty="0"/>
-              <a:t>Comparaison modèles et suggestion</a:t>
-            </a:r>
-          </a:p>
-          <a:p>
-            <a:r>
-              <a:rPr lang="fr-CA" sz="2400" dirty="0"/>
-              <a:t>Conclusion</a:t>
-            </a:r>
-          </a:p>
-        </p:txBody>
-      </p:sp>
-      <p:grpSp>
-        <p:nvGrpSpPr>
-          <p:cNvPr id="12" name="Group 11">
-            <a:extLst>
-              <a:ext uri="{FF2B5EF4-FFF2-40B4-BE49-F238E27FC236}">
-                <a16:creationId xmlns:a16="http://schemas.microsoft.com/office/drawing/2014/main" id="{828A5161-06F1-46CF-8AD7-844680A59E13}"/>
-              </a:ext>
-              <a:ext uri="{C183D7F6-B498-43B3-948B-1728B52AA6E4}">
-                <adec:decorative xmlns:adec="http://schemas.microsoft.com/office/drawing/2017/decorative" val="1"/>
-              </a:ext>
-            </a:extLst>
-          </p:cNvPr>
-          <p:cNvGrpSpPr>
-            <a:grpSpLocks noGrp="1" noUngrp="1" noRot="1" noChangeAspect="1" noMove="1" noResize="1"/>
-          </p:cNvGrpSpPr>
-          <p:nvPr>
-            <p:extLst>
-              <p:ext uri="{386F3935-93C4-4BCD-93E2-E3B085C9AB24}">
-                <p16:designElem xmlns:p16="http://schemas.microsoft.com/office/powerpoint/2015/main" val="1"/>
-              </p:ext>
-            </p:extLst>
-          </p:nvPr>
-        </p:nvGrpSpPr>
-        <p:grpSpPr>
-          <a:xfrm>
-            <a:off x="0" y="4601497"/>
-            <a:ext cx="1014060" cy="2017580"/>
-            <a:chOff x="0" y="4601497"/>
-            <a:chExt cx="1014060" cy="2017580"/>
-          </a:xfrm>
-        </p:grpSpPr>
-        <p:sp>
-          <p:nvSpPr>
-            <p:cNvPr id="13" name="Isosceles Triangle 12">
-              <a:extLst>
-                <a:ext uri="{FF2B5EF4-FFF2-40B4-BE49-F238E27FC236}">
-                  <a16:creationId xmlns:a16="http://schemas.microsoft.com/office/drawing/2014/main" id="{D3F51FEB-38FB-4F6C-9F7B-2F2AFAB65463}"/>
-                </a:ext>
-                <a:ext uri="{C183D7F6-B498-43B3-948B-1728B52AA6E4}">
-                  <adec:decorative xmlns:adec="http://schemas.microsoft.com/office/drawing/2017/decorative" val="1"/>
-                </a:ext>
-              </a:extLst>
-            </p:cNvPr>
-            <p:cNvSpPr/>
-            <p:nvPr>
-              <p:extLst>
-                <p:ext uri="{386F3935-93C4-4BCD-93E2-E3B085C9AB24}">
-                  <p16:designElem xmlns:p16="http://schemas.microsoft.com/office/powerpoint/2015/main" val="1"/>
-                </p:ext>
-              </p:extLst>
-            </p:nvPr>
-          </p:nvSpPr>
-          <p:spPr>
-            <a:xfrm rot="5400000">
-              <a:off x="-501760" y="5103257"/>
-              <a:ext cx="2017580" cy="1014060"/>
-            </a:xfrm>
-            <a:prstGeom prst="triangle">
-              <a:avLst>
-                <a:gd name="adj" fmla="val 50000"/>
-              </a:avLst>
-            </a:prstGeom>
-            <a:solidFill>
-              <a:schemeClr val="accent1">
-                <a:alpha val="30000"/>
-              </a:schemeClr>
-            </a:solidFill>
-            <a:ln>
-              <a:noFill/>
-            </a:ln>
-          </p:spPr>
-          <p:style>
-            <a:lnRef idx="2">
-              <a:schemeClr val="accent1">
-                <a:shade val="50000"/>
-              </a:schemeClr>
-            </a:lnRef>
-            <a:fillRef idx="1">
-              <a:schemeClr val="accent1"/>
-            </a:fillRef>
-            <a:effectRef idx="0">
-              <a:schemeClr val="accent1"/>
-            </a:effectRef>
-            <a:fontRef idx="minor">
-              <a:schemeClr val="lt1"/>
-            </a:fontRef>
-          </p:style>
-          <p:txBody>
-            <a:bodyPr rtlCol="0" anchor="ctr"/>
-            <a:lstStyle/>
-            <a:p>
-              <a:pPr algn="ctr"/>
-              <a:endParaRPr lang="en-US"/>
-            </a:p>
-          </p:txBody>
-        </p:sp>
-        <p:sp>
-          <p:nvSpPr>
-            <p:cNvPr id="14" name="Rectangle 13">
-              <a:extLst>
-                <a:ext uri="{FF2B5EF4-FFF2-40B4-BE49-F238E27FC236}">
-                  <a16:creationId xmlns:a16="http://schemas.microsoft.com/office/drawing/2014/main" id="{1E547BA6-BAE0-43BB-A7CA-60F69CE252F0}"/>
-                </a:ext>
-                <a:ext uri="{C183D7F6-B498-43B3-948B-1728B52AA6E4}">
-                  <adec:decorative xmlns:adec="http://schemas.microsoft.com/office/drawing/2017/decorative" val="1"/>
-                </a:ext>
-              </a:extLst>
-            </p:cNvPr>
-            <p:cNvSpPr/>
-            <p:nvPr>
-              <p:extLst>
-                <p:ext uri="{386F3935-93C4-4BCD-93E2-E3B085C9AB24}">
-                  <p16:designElem xmlns:p16="http://schemas.microsoft.com/office/powerpoint/2015/main" val="1"/>
-                </p:ext>
-              </p:extLst>
-            </p:nvPr>
-          </p:nvSpPr>
-          <p:spPr>
-            <a:xfrm rot="2700000">
-              <a:off x="427916" y="5728708"/>
-              <a:ext cx="485578" cy="485578"/>
-            </a:xfrm>
-            <a:prstGeom prst="rect">
-              <a:avLst/>
-            </a:prstGeom>
-            <a:solidFill>
-              <a:schemeClr val="accent1">
-                <a:alpha val="30000"/>
-              </a:schemeClr>
-            </a:solidFill>
-            <a:ln>
-              <a:noFill/>
-            </a:ln>
-          </p:spPr>
-          <p:style>
-            <a:lnRef idx="2">
-              <a:schemeClr val="accent1">
-                <a:shade val="50000"/>
-              </a:schemeClr>
-            </a:lnRef>
-            <a:fillRef idx="1">
-              <a:schemeClr val="accent1"/>
-            </a:fillRef>
-            <a:effectRef idx="0">
-              <a:schemeClr val="accent1"/>
-            </a:effectRef>
-            <a:fontRef idx="minor">
-              <a:schemeClr val="lt1"/>
-            </a:fontRef>
-          </p:style>
-          <p:txBody>
-            <a:bodyPr rtlCol="0" anchor="ctr"/>
-            <a:lstStyle/>
-            <a:p>
-              <a:pPr algn="ctr"/>
-              <a:endParaRPr lang="en-US"/>
-            </a:p>
-          </p:txBody>
-        </p:sp>
-      </p:grpSp>
-      <p:grpSp>
-        <p:nvGrpSpPr>
-          <p:cNvPr id="16" name="Group 15">
-            <a:extLst>
-              <a:ext uri="{FF2B5EF4-FFF2-40B4-BE49-F238E27FC236}">
-                <a16:creationId xmlns:a16="http://schemas.microsoft.com/office/drawing/2014/main" id="{5995D10D-E9C9-47DB-AE7E-801FEF38F5C9}"/>
-              </a:ext>
-              <a:ext uri="{C183D7F6-B498-43B3-948B-1728B52AA6E4}">
-                <adec:decorative xmlns:adec="http://schemas.microsoft.com/office/drawing/2017/decorative" val="1"/>
-              </a:ext>
-            </a:extLst>
-          </p:cNvPr>
-          <p:cNvGrpSpPr>
-            <a:grpSpLocks noGrp="1" noUngrp="1" noRot="1" noChangeAspect="1" noMove="1" noResize="1"/>
-          </p:cNvGrpSpPr>
-          <p:nvPr>
-            <p:extLst>
-              <p:ext uri="{386F3935-93C4-4BCD-93E2-E3B085C9AB24}">
-                <p16:designElem xmlns:p16="http://schemas.microsoft.com/office/powerpoint/2015/main" val="1"/>
-              </p:ext>
-            </p:extLst>
-          </p:nvPr>
-        </p:nvGrpSpPr>
-        <p:grpSpPr>
-          <a:xfrm>
-            <a:off x="11219290" y="1"/>
-            <a:ext cx="972709" cy="1935307"/>
-            <a:chOff x="10918968" y="713127"/>
-            <a:chExt cx="1273032" cy="2532832"/>
-          </a:xfrm>
-        </p:grpSpPr>
-        <p:sp>
-          <p:nvSpPr>
-            <p:cNvPr id="17" name="Rectangle 16">
-              <a:extLst>
-                <a:ext uri="{FF2B5EF4-FFF2-40B4-BE49-F238E27FC236}">
-                  <a16:creationId xmlns:a16="http://schemas.microsoft.com/office/drawing/2014/main" id="{CC1A72C6-3DE4-4EC3-9AD5-9E0D40D8CE8A}"/>
-                </a:ext>
-                <a:ext uri="{C183D7F6-B498-43B3-948B-1728B52AA6E4}">
-                  <adec:decorative xmlns:adec="http://schemas.microsoft.com/office/drawing/2017/decorative" val="1"/>
-                </a:ext>
-              </a:extLst>
-            </p:cNvPr>
-            <p:cNvSpPr/>
-            <p:nvPr>
-              <p:extLst>
-                <p:ext uri="{386F3935-93C4-4BCD-93E2-E3B085C9AB24}">
-                  <p16:designElem xmlns:p16="http://schemas.microsoft.com/office/powerpoint/2015/main" val="1"/>
-                </p:ext>
-              </p:extLst>
-            </p:nvPr>
-          </p:nvSpPr>
-          <p:spPr>
-            <a:xfrm rot="2700000">
-              <a:off x="11052629" y="2120024"/>
-              <a:ext cx="645368" cy="645368"/>
-            </a:xfrm>
-            <a:prstGeom prst="rect">
-              <a:avLst/>
-            </a:prstGeom>
-            <a:solidFill>
-              <a:schemeClr val="accent4">
-                <a:alpha val="30000"/>
-              </a:schemeClr>
-            </a:solidFill>
-            <a:ln>
-              <a:noFill/>
-            </a:ln>
-          </p:spPr>
-          <p:style>
-            <a:lnRef idx="2">
-              <a:schemeClr val="accent1">
-                <a:shade val="50000"/>
-              </a:schemeClr>
-            </a:lnRef>
-            <a:fillRef idx="1">
-              <a:schemeClr val="accent1"/>
-            </a:fillRef>
-            <a:effectRef idx="0">
-              <a:schemeClr val="accent1"/>
-            </a:effectRef>
-            <a:fontRef idx="minor">
-              <a:schemeClr val="lt1"/>
-            </a:fontRef>
-          </p:style>
-          <p:txBody>
-            <a:bodyPr rtlCol="0" anchor="ctr"/>
-            <a:lstStyle/>
-            <a:p>
-              <a:pPr algn="ctr"/>
-              <a:endParaRPr lang="en-US"/>
-            </a:p>
-          </p:txBody>
-        </p:sp>
-        <p:sp>
-          <p:nvSpPr>
-            <p:cNvPr id="18" name="Isosceles Triangle 17">
-              <a:extLst>
-                <a:ext uri="{FF2B5EF4-FFF2-40B4-BE49-F238E27FC236}">
-                  <a16:creationId xmlns:a16="http://schemas.microsoft.com/office/drawing/2014/main" id="{0B0DA1F1-C391-4EDF-9FE0-23E86E137765}"/>
-                </a:ext>
-                <a:ext uri="{C183D7F6-B498-43B3-948B-1728B52AA6E4}">
-                  <adec:decorative xmlns:adec="http://schemas.microsoft.com/office/drawing/2017/decorative" val="1"/>
-                </a:ext>
-              </a:extLst>
-            </p:cNvPr>
-            <p:cNvSpPr/>
-            <p:nvPr>
-              <p:extLst>
-                <p:ext uri="{386F3935-93C4-4BCD-93E2-E3B085C9AB24}">
-                  <p16:designElem xmlns:p16="http://schemas.microsoft.com/office/powerpoint/2015/main" val="1"/>
-                </p:ext>
-              </p:extLst>
-            </p:nvPr>
-          </p:nvSpPr>
-          <p:spPr>
-            <a:xfrm rot="16200000">
-              <a:off x="10289068" y="1343027"/>
-              <a:ext cx="2532832" cy="1273032"/>
-            </a:xfrm>
-            <a:prstGeom prst="triangle">
-              <a:avLst>
-                <a:gd name="adj" fmla="val 50000"/>
-              </a:avLst>
-            </a:prstGeom>
-            <a:solidFill>
-              <a:schemeClr val="accent4">
-                <a:alpha val="30000"/>
-              </a:schemeClr>
-            </a:solidFill>
-            <a:ln>
-              <a:noFill/>
-            </a:ln>
-          </p:spPr>
-          <p:style>
-            <a:lnRef idx="2">
-              <a:schemeClr val="accent1">
-                <a:shade val="50000"/>
-              </a:schemeClr>
-            </a:lnRef>
-            <a:fillRef idx="1">
-              <a:schemeClr val="accent1"/>
-            </a:fillRef>
-            <a:effectRef idx="0">
-              <a:schemeClr val="accent1"/>
-            </a:effectRef>
-            <a:fontRef idx="minor">
-              <a:schemeClr val="lt1"/>
-            </a:fontRef>
-          </p:style>
-          <p:txBody>
-            <a:bodyPr rtlCol="0" anchor="ctr"/>
-            <a:lstStyle/>
-            <a:p>
-              <a:pPr algn="ctr"/>
-              <a:endParaRPr lang="en-US" dirty="0"/>
-            </a:p>
-          </p:txBody>
-        </p:sp>
-      </p:grpSp>
-    </p:spTree>
-    <p:extLst>
-      <p:ext uri="{BB962C8B-B14F-4D97-AF65-F5344CB8AC3E}">
-        <p14:creationId xmlns:p14="http://schemas.microsoft.com/office/powerpoint/2010/main" val="2883009267"/>
-      </p:ext>
-    </p:extLst>
-  </p:cSld>
-  <p:clrMapOvr>
-    <a:masterClrMapping/>
-  </p:clrMapOvr>
-</p:sld>
-</file>
-
-<file path=ppt/slides/slide4.xml><?xml version="1.0" encoding="utf-8"?>
-<p:sld xmlns:a="http://schemas.openxmlformats.org/drawingml/2006/main" xmlns:r="http://schemas.openxmlformats.org/officeDocument/2006/relationships" xmlns:p="http://schemas.openxmlformats.org/presentationml/2006/main">
-  <p:cSld>
-    <p:bg>
-      <p:bgPr>
-        <a:solidFill>
-          <a:schemeClr val="bg1"/>
-        </a:solidFill>
-        <a:effectLst/>
-      </p:bgPr>
-    </p:bg>
-    <p:spTree>
-      <p:nvGrpSpPr>
-        <p:cNvPr id="1" name=""/>
-        <p:cNvGrpSpPr/>
-        <p:nvPr/>
-      </p:nvGrpSpPr>
-      <p:grpSpPr>
-        <a:xfrm>
-          <a:off x="0" y="0"/>
-          <a:ext cx="0" cy="0"/>
-          <a:chOff x="0" y="0"/>
-          <a:chExt cx="0" cy="0"/>
-        </a:xfrm>
-      </p:grpSpPr>
-      <p:sp>
-        <p:nvSpPr>
-          <p:cNvPr id="9" name="Rectangle 8">
-            <a:extLst>
-              <a:ext uri="{FF2B5EF4-FFF2-40B4-BE49-F238E27FC236}">
-                <a16:creationId xmlns:a16="http://schemas.microsoft.com/office/drawing/2014/main" id="{2B566528-1B12-4246-9431-5C2D7D081168}"/>
-              </a:ext>
-              <a:ext uri="{C183D7F6-B498-43B3-948B-1728B52AA6E4}">
-                <adec:decorative xmlns:adec="http://schemas.microsoft.com/office/drawing/2017/decorative" val="1"/>
-              </a:ext>
-            </a:extLst>
-          </p:cNvPr>
-          <p:cNvSpPr>
-            <a:spLocks noGrp="1" noRot="1" noChangeAspect="1" noMove="1" noResize="1" noEditPoints="1" noAdjustHandles="1" noChangeArrowheads="1" noChangeShapeType="1" noTextEdit="1"/>
-          </p:cNvSpPr>
-          <p:nvPr>
-            <p:extLst>
-              <p:ext uri="{386F3935-93C4-4BCD-93E2-E3B085C9AB24}">
-                <p16:designElem xmlns:p16="http://schemas.microsoft.com/office/powerpoint/2015/main" val="1"/>
-              </p:ext>
-            </p:extLst>
-          </p:nvPr>
-        </p:nvSpPr>
-        <p:spPr>
-          <a:xfrm>
-            <a:off x="0" y="0"/>
-            <a:ext cx="12192000" cy="6858000"/>
-          </a:xfrm>
-          <a:prstGeom prst="rect">
-            <a:avLst/>
-          </a:prstGeom>
-          <a:solidFill>
-            <a:schemeClr val="bg1"/>
-          </a:solidFill>
-          <a:ln>
-            <a:noFill/>
-          </a:ln>
-        </p:spPr>
-        <p:style>
-          <a:lnRef idx="2">
-            <a:schemeClr val="accent1">
-              <a:shade val="50000"/>
-            </a:schemeClr>
-          </a:lnRef>
-          <a:fillRef idx="1">
-            <a:schemeClr val="accent1"/>
-          </a:fillRef>
-          <a:effectRef idx="0">
-            <a:schemeClr val="accent1"/>
-          </a:effectRef>
-          <a:fontRef idx="minor">
-            <a:schemeClr val="lt1"/>
-          </a:fontRef>
-        </p:style>
-        <p:txBody>
-          <a:bodyPr rtlCol="0" anchor="ctr"/>
-          <a:lstStyle/>
-          <a:p>
-            <a:pPr algn="ctr"/>
-            <a:endParaRPr lang="en-US" dirty="0"/>
-          </a:p>
-        </p:txBody>
-      </p:sp>
-      <p:sp>
-        <p:nvSpPr>
-          <p:cNvPr id="2" name="Title 1">
-            <a:extLst>
-              <a:ext uri="{FF2B5EF4-FFF2-40B4-BE49-F238E27FC236}">
-                <a16:creationId xmlns:a16="http://schemas.microsoft.com/office/drawing/2014/main" id="{FED8B387-E483-43B2-9D79-AAEE77CD6668}"/>
-              </a:ext>
-            </a:extLst>
-          </p:cNvPr>
-          <p:cNvSpPr>
-            <a:spLocks noGrp="1"/>
-          </p:cNvSpPr>
-          <p:nvPr>
-            <p:ph type="title"/>
-          </p:nvPr>
-        </p:nvSpPr>
-        <p:spPr>
-          <a:xfrm>
-            <a:off x="643467" y="321734"/>
-            <a:ext cx="10905066" cy="1135737"/>
-          </a:xfrm>
-        </p:spPr>
-        <p:txBody>
-          <a:bodyPr>
-            <a:normAutofit/>
-          </a:bodyPr>
-          <a:lstStyle/>
-          <a:p>
-            <a:r>
               <a:rPr lang="fr-CA" sz="3600" dirty="0"/>
               <a:t>Exploration et analyse des données</a:t>
             </a:r>
@@ -9511,17 +9423,8 @@
               <a:rPr lang="fr-CA" sz="2400" dirty="0">
                 <a:sym typeface="Wingdings" panose="05000000000000000000" pitchFamily="2" charset="2"/>
               </a:rPr>
-              <a:t>Crédit de biens de </a:t>
+              <a:t>Crédit de biens de consommation</a:t>
             </a:r>
-            <a:r>
-              <a:rPr lang="fr-CA" sz="2400" dirty="0" err="1">
-                <a:sym typeface="Wingdings" panose="05000000000000000000" pitchFamily="2" charset="2"/>
-              </a:rPr>
-              <a:t>consomation</a:t>
-            </a:r>
-            <a:endParaRPr lang="fr-CA" sz="2400" dirty="0">
-              <a:sym typeface="Wingdings" panose="05000000000000000000" pitchFamily="2" charset="2"/>
-            </a:endParaRPr>
           </a:p>
           <a:p>
             <a:r>
@@ -9530,56 +9433,6 @@
               </a:rPr>
               <a:t>Pas d’information de devise</a:t>
             </a:r>
-          </a:p>
-          <a:p>
-            <a:r>
-              <a:rPr lang="fr-CA" sz="2400" dirty="0" err="1">
-                <a:sym typeface="Wingdings" panose="05000000000000000000" pitchFamily="2" charset="2"/>
-              </a:rPr>
-              <a:t>Kaggle</a:t>
-            </a:r>
-            <a:r>
-              <a:rPr lang="fr-CA" sz="2400" dirty="0">
-                <a:sym typeface="Wingdings" panose="05000000000000000000" pitchFamily="2" charset="2"/>
-              </a:rPr>
-              <a:t> notebook:</a:t>
-            </a:r>
-          </a:p>
-          <a:p>
-            <a:pPr lvl="1"/>
-            <a:r>
-              <a:rPr lang="fr-CA" sz="2000" dirty="0" err="1"/>
-              <a:t>Feature</a:t>
-            </a:r>
-            <a:r>
-              <a:rPr lang="fr-CA" sz="2000" dirty="0"/>
-              <a:t> engineering avec tous les </a:t>
-            </a:r>
-            <a:r>
-              <a:rPr lang="fr-CA" sz="2000" dirty="0" err="1"/>
-              <a:t>datasets</a:t>
-            </a:r>
-            <a:endParaRPr lang="fr-CA" sz="2000" dirty="0"/>
-          </a:p>
-          <a:p>
-            <a:pPr lvl="1"/>
-            <a:r>
-              <a:rPr lang="fr-CA" sz="2000" dirty="0"/>
-              <a:t>Model </a:t>
-            </a:r>
-            <a:r>
-              <a:rPr lang="fr-CA" sz="2000" dirty="0">
-                <a:sym typeface="Wingdings" panose="05000000000000000000" pitchFamily="2" charset="2"/>
-              </a:rPr>
-              <a:t> </a:t>
-            </a:r>
-            <a:r>
-              <a:rPr lang="fr-CA" sz="2000" dirty="0"/>
-              <a:t>LGBM classifier</a:t>
-            </a:r>
-          </a:p>
-          <a:p>
-            <a:pPr lvl="1"/>
             <a:endParaRPr lang="fr-CA" sz="2000" dirty="0">
               <a:sym typeface="Wingdings" panose="05000000000000000000" pitchFamily="2" charset="2"/>
             </a:endParaRPr>
@@ -9933,36 +9786,8 @@
         </p:blipFill>
         <p:spPr>
           <a:xfrm>
-            <a:off x="4924208" y="2265632"/>
-            <a:ext cx="6781436" cy="4353445"/>
-          </a:xfrm>
-          <a:prstGeom prst="rect">
-            <a:avLst/>
-          </a:prstGeom>
-        </p:spPr>
-      </p:pic>
-      <p:pic>
-        <p:nvPicPr>
-          <p:cNvPr id="14" name="Picture 13">
-            <a:extLst>
-              <a:ext uri="{FF2B5EF4-FFF2-40B4-BE49-F238E27FC236}">
-                <a16:creationId xmlns:a16="http://schemas.microsoft.com/office/drawing/2014/main" id="{23E6DF2D-E8FE-4A71-A93C-AC6B64EC1CFB}"/>
-              </a:ext>
-            </a:extLst>
-          </p:cNvPr>
-          <p:cNvPicPr/>
-          <p:nvPr/>
-        </p:nvPicPr>
-        <p:blipFill>
-          <a:blip r:embed="rId4"/>
-          <a:stretch>
-            <a:fillRect/>
-          </a:stretch>
-        </p:blipFill>
-        <p:spPr>
-          <a:xfrm>
-            <a:off x="4924208" y="1057221"/>
-            <a:ext cx="5411852" cy="1159134"/>
+            <a:off x="4568664" y="1321553"/>
+            <a:ext cx="7295987" cy="4683769"/>
           </a:xfrm>
           <a:prstGeom prst="rect">
             <a:avLst/>
@@ -11325,7 +11150,7 @@
                         </a:spcAft>
                       </a:pPr>
                       <a:r>
-                        <a:rPr lang="en-US" sz="1800" b="1">
+                        <a:rPr lang="en-US" sz="1800" b="1" dirty="0">
                           <a:solidFill>
                             <a:schemeClr val="accent2">
                               <a:lumMod val="75000"/>
@@ -11338,7 +11163,7 @@
                         </a:rPr>
                         <a:t>False repaid</a:t>
                       </a:r>
-                      <a:endParaRPr lang="en-CA" sz="1800">
+                      <a:endParaRPr lang="en-CA" sz="1800" dirty="0">
                         <a:solidFill>
                           <a:schemeClr val="accent2">
                             <a:lumMod val="75000"/>
@@ -11977,6 +11802,27 @@
             <a:endParaRPr lang="fr-CA" dirty="0"/>
           </a:p>
           <a:p>
+            <a:pPr lvl="1"/>
+            <a:r>
+              <a:rPr lang="fr-CA" dirty="0" err="1"/>
+              <a:t>Eval_metric</a:t>
+            </a:r>
+            <a:r>
+              <a:rPr lang="fr-CA" dirty="0"/>
+              <a:t> = </a:t>
+            </a:r>
+            <a:r>
+              <a:rPr lang="en-US" dirty="0"/>
+              <a:t>‘</a:t>
+            </a:r>
+            <a:r>
+              <a:rPr lang="en-US" dirty="0" err="1"/>
+              <a:t>auc</a:t>
+            </a:r>
+            <a:r>
+              <a:rPr lang="en-US" dirty="0"/>
+              <a:t>’</a:t>
+            </a:r>
             <a:endParaRPr lang="fr-CA" dirty="0"/>
           </a:p>
           <a:p>
@@ -13851,1273 +13697,6 @@
     <p:extLst>
       <p:ext uri="{BB962C8B-B14F-4D97-AF65-F5344CB8AC3E}">
         <p14:creationId xmlns:p14="http://schemas.microsoft.com/office/powerpoint/2010/main" val="352200682"/>
-      </p:ext>
-    </p:extLst>
-  </p:cSld>
-  <p:clrMapOvr>
-    <a:masterClrMapping/>
-  </p:clrMapOvr>
-</p:sld>
-</file>
-
-<file path=ppt/slides/slide9.xml><?xml version="1.0" encoding="utf-8"?>
-<p:sld xmlns:a="http://schemas.openxmlformats.org/drawingml/2006/main" xmlns:r="http://schemas.openxmlformats.org/officeDocument/2006/relationships" xmlns:p="http://schemas.openxmlformats.org/presentationml/2006/main">
-  <p:cSld>
-    <p:bg>
-      <p:bgPr>
-        <a:solidFill>
-          <a:schemeClr val="bg1"/>
-        </a:solidFill>
-        <a:effectLst/>
-      </p:bgPr>
-    </p:bg>
-    <p:spTree>
-      <p:nvGrpSpPr>
-        <p:cNvPr id="1" name=""/>
-        <p:cNvGrpSpPr/>
-        <p:nvPr/>
-      </p:nvGrpSpPr>
-      <p:grpSpPr>
-        <a:xfrm>
-          <a:off x="0" y="0"/>
-          <a:ext cx="0" cy="0"/>
-          <a:chOff x="0" y="0"/>
-          <a:chExt cx="0" cy="0"/>
-        </a:xfrm>
-      </p:grpSpPr>
-      <p:sp>
-        <p:nvSpPr>
-          <p:cNvPr id="10" name="Rectangle 9">
-            <a:extLst>
-              <a:ext uri="{FF2B5EF4-FFF2-40B4-BE49-F238E27FC236}">
-                <a16:creationId xmlns:a16="http://schemas.microsoft.com/office/drawing/2014/main" id="{88294908-8B00-4F58-BBBA-20F71A40AA9E}"/>
-              </a:ext>
-              <a:ext uri="{C183D7F6-B498-43B3-948B-1728B52AA6E4}">
-                <adec:decorative xmlns:adec="http://schemas.microsoft.com/office/drawing/2017/decorative" val="1"/>
-              </a:ext>
-            </a:extLst>
-          </p:cNvPr>
-          <p:cNvSpPr>
-            <a:spLocks noGrp="1" noRot="1" noChangeAspect="1" noMove="1" noResize="1" noEditPoints="1" noAdjustHandles="1" noChangeArrowheads="1" noChangeShapeType="1" noTextEdit="1"/>
-          </p:cNvSpPr>
-          <p:nvPr>
-            <p:extLst>
-              <p:ext uri="{386F3935-93C4-4BCD-93E2-E3B085C9AB24}">
-                <p16:designElem xmlns:p16="http://schemas.microsoft.com/office/powerpoint/2015/main" val="1"/>
-              </p:ext>
-            </p:extLst>
-          </p:nvPr>
-        </p:nvSpPr>
-        <p:spPr>
-          <a:xfrm>
-            <a:off x="0" y="0"/>
-            <a:ext cx="12192000" cy="6858000"/>
-          </a:xfrm>
-          <a:prstGeom prst="rect">
-            <a:avLst/>
-          </a:prstGeom>
-          <a:solidFill>
-            <a:schemeClr val="bg2"/>
-          </a:solidFill>
-          <a:ln>
-            <a:noFill/>
-          </a:ln>
-        </p:spPr>
-        <p:style>
-          <a:lnRef idx="2">
-            <a:schemeClr val="accent1">
-              <a:shade val="50000"/>
-            </a:schemeClr>
-          </a:lnRef>
-          <a:fillRef idx="1">
-            <a:schemeClr val="accent1"/>
-          </a:fillRef>
-          <a:effectRef idx="0">
-            <a:schemeClr val="accent1"/>
-          </a:effectRef>
-          <a:fontRef idx="minor">
-            <a:schemeClr val="lt1"/>
-          </a:fontRef>
-        </p:style>
-        <p:txBody>
-          <a:bodyPr rtlCol="0" anchor="ctr"/>
-          <a:lstStyle/>
-          <a:p>
-            <a:pPr algn="ctr"/>
-            <a:endParaRPr lang="en-US" dirty="0"/>
-          </a:p>
-        </p:txBody>
-      </p:sp>
-      <p:sp>
-        <p:nvSpPr>
-          <p:cNvPr id="12" name="Freeform: Shape 11">
-            <a:extLst>
-              <a:ext uri="{FF2B5EF4-FFF2-40B4-BE49-F238E27FC236}">
-                <a16:creationId xmlns:a16="http://schemas.microsoft.com/office/drawing/2014/main" id="{4364C879-1404-4203-8E9D-CC5DE0A621A2}"/>
-              </a:ext>
-              <a:ext uri="{C183D7F6-B498-43B3-948B-1728B52AA6E4}">
-                <adec:decorative xmlns:adec="http://schemas.microsoft.com/office/drawing/2017/decorative" val="1"/>
-              </a:ext>
-            </a:extLst>
-          </p:cNvPr>
-          <p:cNvSpPr>
-            <a:spLocks noGrp="1" noRot="1" noChangeAspect="1" noMove="1" noResize="1" noEditPoints="1" noAdjustHandles="1" noChangeArrowheads="1" noChangeShapeType="1" noTextEdit="1"/>
-          </p:cNvSpPr>
-          <p:nvPr>
-            <p:extLst>
-              <p:ext uri="{386F3935-93C4-4BCD-93E2-E3B085C9AB24}">
-                <p16:designElem xmlns:p16="http://schemas.microsoft.com/office/powerpoint/2015/main" val="1"/>
-              </p:ext>
-            </p:extLst>
-          </p:nvPr>
-        </p:nvSpPr>
-        <p:spPr>
-          <a:xfrm rot="2700000">
-            <a:off x="82782" y="-1386168"/>
-            <a:ext cx="2424873" cy="3611191"/>
-          </a:xfrm>
-          <a:custGeom>
-            <a:avLst/>
-            <a:gdLst>
-              <a:gd name="connsiteX0" fmla="*/ 0 w 2424873"/>
-              <a:gd name="connsiteY0" fmla="*/ 2424874 h 3611191"/>
-              <a:gd name="connsiteX1" fmla="*/ 2424873 w 2424873"/>
-              <a:gd name="connsiteY1" fmla="*/ 0 h 3611191"/>
-              <a:gd name="connsiteX2" fmla="*/ 2424873 w 2424873"/>
-              <a:gd name="connsiteY2" fmla="*/ 3611191 h 3611191"/>
-              <a:gd name="connsiteX3" fmla="*/ 1186317 w 2424873"/>
-              <a:gd name="connsiteY3" fmla="*/ 3611191 h 3611191"/>
-            </a:gdLst>
-            <a:ahLst/>
-            <a:cxnLst>
-              <a:cxn ang="0">
-                <a:pos x="connsiteX0" y="connsiteY0"/>
-              </a:cxn>
-              <a:cxn ang="0">
-                <a:pos x="connsiteX1" y="connsiteY1"/>
-              </a:cxn>
-              <a:cxn ang="0">
-                <a:pos x="connsiteX2" y="connsiteY2"/>
-              </a:cxn>
-              <a:cxn ang="0">
-                <a:pos x="connsiteX3" y="connsiteY3"/>
-              </a:cxn>
-            </a:cxnLst>
-            <a:rect l="l" t="t" r="r" b="b"/>
-            <a:pathLst>
-              <a:path w="2424873" h="3611191">
-                <a:moveTo>
-                  <a:pt x="0" y="2424874"/>
-                </a:moveTo>
-                <a:lnTo>
-                  <a:pt x="2424873" y="0"/>
-                </a:lnTo>
-                <a:lnTo>
-                  <a:pt x="2424873" y="3611191"/>
-                </a:lnTo>
-                <a:lnTo>
-                  <a:pt x="1186317" y="3611191"/>
-                </a:lnTo>
-                <a:close/>
-              </a:path>
-            </a:pathLst>
-          </a:custGeom>
-          <a:solidFill>
-            <a:schemeClr val="accent4">
-              <a:alpha val="40000"/>
-            </a:schemeClr>
-          </a:solidFill>
-          <a:ln>
-            <a:noFill/>
-          </a:ln>
-        </p:spPr>
-        <p:style>
-          <a:lnRef idx="2">
-            <a:schemeClr val="accent1">
-              <a:shade val="50000"/>
-            </a:schemeClr>
-          </a:lnRef>
-          <a:fillRef idx="1">
-            <a:schemeClr val="accent1"/>
-          </a:fillRef>
-          <a:effectRef idx="0">
-            <a:schemeClr val="accent1"/>
-          </a:effectRef>
-          <a:fontRef idx="minor">
-            <a:schemeClr val="lt1"/>
-          </a:fontRef>
-        </p:style>
-        <p:txBody>
-          <a:bodyPr wrap="square" rtlCol="0" anchor="ctr">
-            <a:noAutofit/>
-          </a:bodyPr>
-          <a:lstStyle/>
-          <a:p>
-            <a:pPr algn="ctr"/>
-            <a:endParaRPr lang="en-US"/>
-          </a:p>
-        </p:txBody>
-      </p:sp>
-      <p:sp>
-        <p:nvSpPr>
-          <p:cNvPr id="14" name="Freeform: Shape 13">
-            <a:extLst>
-              <a:ext uri="{FF2B5EF4-FFF2-40B4-BE49-F238E27FC236}">
-                <a16:creationId xmlns:a16="http://schemas.microsoft.com/office/drawing/2014/main" id="{84617302-4B0D-4351-A6BB-6F0930D943AC}"/>
-              </a:ext>
-              <a:ext uri="{C183D7F6-B498-43B3-948B-1728B52AA6E4}">
-                <adec:decorative xmlns:adec="http://schemas.microsoft.com/office/drawing/2017/decorative" val="1"/>
-              </a:ext>
-            </a:extLst>
-          </p:cNvPr>
-          <p:cNvSpPr>
-            <a:spLocks noGrp="1" noRot="1" noChangeAspect="1" noMove="1" noResize="1" noEditPoints="1" noAdjustHandles="1" noChangeArrowheads="1" noChangeShapeType="1" noTextEdit="1"/>
-          </p:cNvSpPr>
-          <p:nvPr>
-            <p:extLst>
-              <p:ext uri="{386F3935-93C4-4BCD-93E2-E3B085C9AB24}">
-                <p16:designElem xmlns:p16="http://schemas.microsoft.com/office/powerpoint/2015/main" val="1"/>
-              </p:ext>
-            </p:extLst>
-          </p:nvPr>
-        </p:nvSpPr>
-        <p:spPr>
-          <a:xfrm rot="2700000">
-            <a:off x="1571000" y="-338582"/>
-            <a:ext cx="1635955" cy="1635955"/>
-          </a:xfrm>
-          <a:custGeom>
-            <a:avLst/>
-            <a:gdLst>
-              <a:gd name="connsiteX0" fmla="*/ 0 w 1635955"/>
-              <a:gd name="connsiteY0" fmla="*/ 957987 h 1635955"/>
-              <a:gd name="connsiteX1" fmla="*/ 957987 w 1635955"/>
-              <a:gd name="connsiteY1" fmla="*/ 0 h 1635955"/>
-              <a:gd name="connsiteX2" fmla="*/ 1635955 w 1635955"/>
-              <a:gd name="connsiteY2" fmla="*/ 0 h 1635955"/>
-              <a:gd name="connsiteX3" fmla="*/ 1635955 w 1635955"/>
-              <a:gd name="connsiteY3" fmla="*/ 1635955 h 1635955"/>
-              <a:gd name="connsiteX4" fmla="*/ 0 w 1635955"/>
-              <a:gd name="connsiteY4" fmla="*/ 1635955 h 1635955"/>
-            </a:gdLst>
-            <a:ahLst/>
-            <a:cxnLst>
-              <a:cxn ang="0">
-                <a:pos x="connsiteX0" y="connsiteY0"/>
-              </a:cxn>
-              <a:cxn ang="0">
-                <a:pos x="connsiteX1" y="connsiteY1"/>
-              </a:cxn>
-              <a:cxn ang="0">
-                <a:pos x="connsiteX2" y="connsiteY2"/>
-              </a:cxn>
-              <a:cxn ang="0">
-                <a:pos x="connsiteX3" y="connsiteY3"/>
-              </a:cxn>
-              <a:cxn ang="0">
-                <a:pos x="connsiteX4" y="connsiteY4"/>
-              </a:cxn>
-            </a:cxnLst>
-            <a:rect l="l" t="t" r="r" b="b"/>
-            <a:pathLst>
-              <a:path w="1635955" h="1635955">
-                <a:moveTo>
-                  <a:pt x="0" y="957987"/>
-                </a:moveTo>
-                <a:lnTo>
-                  <a:pt x="957987" y="0"/>
-                </a:lnTo>
-                <a:lnTo>
-                  <a:pt x="1635955" y="0"/>
-                </a:lnTo>
-                <a:lnTo>
-                  <a:pt x="1635955" y="1635955"/>
-                </a:lnTo>
-                <a:lnTo>
-                  <a:pt x="0" y="1635955"/>
-                </a:lnTo>
-                <a:close/>
-              </a:path>
-            </a:pathLst>
-          </a:custGeom>
-          <a:solidFill>
-            <a:schemeClr val="accent4">
-              <a:alpha val="40000"/>
-            </a:schemeClr>
-          </a:solidFill>
-          <a:ln>
-            <a:noFill/>
-          </a:ln>
-        </p:spPr>
-        <p:style>
-          <a:lnRef idx="2">
-            <a:schemeClr val="accent1">
-              <a:shade val="50000"/>
-            </a:schemeClr>
-          </a:lnRef>
-          <a:fillRef idx="1">
-            <a:schemeClr val="accent1"/>
-          </a:fillRef>
-          <a:effectRef idx="0">
-            <a:schemeClr val="accent1"/>
-          </a:effectRef>
-          <a:fontRef idx="minor">
-            <a:schemeClr val="lt1"/>
-          </a:fontRef>
-        </p:style>
-        <p:txBody>
-          <a:bodyPr wrap="square" rtlCol="0" anchor="ctr">
-            <a:noAutofit/>
-          </a:bodyPr>
-          <a:lstStyle/>
-          <a:p>
-            <a:pPr algn="ctr"/>
-            <a:endParaRPr lang="en-US"/>
-          </a:p>
-        </p:txBody>
-      </p:sp>
-      <p:sp>
-        <p:nvSpPr>
-          <p:cNvPr id="16" name="Freeform: Shape 15">
-            <a:extLst>
-              <a:ext uri="{FF2B5EF4-FFF2-40B4-BE49-F238E27FC236}">
-                <a16:creationId xmlns:a16="http://schemas.microsoft.com/office/drawing/2014/main" id="{DA2C7802-C2E0-4218-8F89-8DD7CCD2CD1C}"/>
-              </a:ext>
-              <a:ext uri="{C183D7F6-B498-43B3-948B-1728B52AA6E4}">
-                <adec:decorative xmlns:adec="http://schemas.microsoft.com/office/drawing/2017/decorative" val="1"/>
-              </a:ext>
-            </a:extLst>
-          </p:cNvPr>
-          <p:cNvSpPr>
-            <a:spLocks noGrp="1" noRot="1" noChangeAspect="1" noMove="1" noResize="1" noEditPoints="1" noAdjustHandles="1" noChangeArrowheads="1" noChangeShapeType="1" noTextEdit="1"/>
-          </p:cNvSpPr>
-          <p:nvPr>
-            <p:extLst>
-              <p:ext uri="{386F3935-93C4-4BCD-93E2-E3B085C9AB24}">
-                <p16:designElem xmlns:p16="http://schemas.microsoft.com/office/powerpoint/2015/main" val="1"/>
-              </p:ext>
-            </p:extLst>
-          </p:nvPr>
-        </p:nvSpPr>
-        <p:spPr>
-          <a:xfrm rot="2700000">
-            <a:off x="9627985" y="-6588"/>
-            <a:ext cx="4059393" cy="2548110"/>
-          </a:xfrm>
-          <a:custGeom>
-            <a:avLst/>
-            <a:gdLst>
-              <a:gd name="connsiteX0" fmla="*/ 0 w 4059393"/>
-              <a:gd name="connsiteY0" fmla="*/ 1511282 h 2548110"/>
-              <a:gd name="connsiteX1" fmla="*/ 1511282 w 4059393"/>
-              <a:gd name="connsiteY1" fmla="*/ 0 h 2548110"/>
-              <a:gd name="connsiteX2" fmla="*/ 4059393 w 4059393"/>
-              <a:gd name="connsiteY2" fmla="*/ 2548110 h 2548110"/>
-              <a:gd name="connsiteX3" fmla="*/ 0 w 4059393"/>
-              <a:gd name="connsiteY3" fmla="*/ 2548110 h 2548110"/>
-            </a:gdLst>
-            <a:ahLst/>
-            <a:cxnLst>
-              <a:cxn ang="0">
-                <a:pos x="connsiteX0" y="connsiteY0"/>
-              </a:cxn>
-              <a:cxn ang="0">
-                <a:pos x="connsiteX1" y="connsiteY1"/>
-              </a:cxn>
-              <a:cxn ang="0">
-                <a:pos x="connsiteX2" y="connsiteY2"/>
-              </a:cxn>
-              <a:cxn ang="0">
-                <a:pos x="connsiteX3" y="connsiteY3"/>
-              </a:cxn>
-            </a:cxnLst>
-            <a:rect l="l" t="t" r="r" b="b"/>
-            <a:pathLst>
-              <a:path w="4059393" h="2548110">
-                <a:moveTo>
-                  <a:pt x="0" y="1511282"/>
-                </a:moveTo>
-                <a:lnTo>
-                  <a:pt x="1511282" y="0"/>
-                </a:lnTo>
-                <a:lnTo>
-                  <a:pt x="4059393" y="2548110"/>
-                </a:lnTo>
-                <a:lnTo>
-                  <a:pt x="0" y="2548110"/>
-                </a:lnTo>
-                <a:close/>
-              </a:path>
-            </a:pathLst>
-          </a:custGeom>
-          <a:solidFill>
-            <a:schemeClr val="accent1">
-              <a:alpha val="30000"/>
-            </a:schemeClr>
-          </a:solidFill>
-          <a:ln>
-            <a:noFill/>
-          </a:ln>
-        </p:spPr>
-        <p:style>
-          <a:lnRef idx="2">
-            <a:schemeClr val="accent1">
-              <a:shade val="50000"/>
-            </a:schemeClr>
-          </a:lnRef>
-          <a:fillRef idx="1">
-            <a:schemeClr val="accent1"/>
-          </a:fillRef>
-          <a:effectRef idx="0">
-            <a:schemeClr val="accent1"/>
-          </a:effectRef>
-          <a:fontRef idx="minor">
-            <a:schemeClr val="lt1"/>
-          </a:fontRef>
-        </p:style>
-        <p:txBody>
-          <a:bodyPr wrap="square" rtlCol="0" anchor="ctr">
-            <a:noAutofit/>
-          </a:bodyPr>
-          <a:lstStyle/>
-          <a:p>
-            <a:pPr algn="ctr"/>
-            <a:endParaRPr lang="en-US"/>
-          </a:p>
-        </p:txBody>
-      </p:sp>
-      <p:sp>
-        <p:nvSpPr>
-          <p:cNvPr id="18" name="Rectangle 17">
-            <a:extLst>
-              <a:ext uri="{FF2B5EF4-FFF2-40B4-BE49-F238E27FC236}">
-                <a16:creationId xmlns:a16="http://schemas.microsoft.com/office/drawing/2014/main" id="{A6D7111A-21E5-4EE9-8A78-10E5530F0116}"/>
-              </a:ext>
-              <a:ext uri="{C183D7F6-B498-43B3-948B-1728B52AA6E4}">
-                <adec:decorative xmlns:adec="http://schemas.microsoft.com/office/drawing/2017/decorative" val="1"/>
-              </a:ext>
-            </a:extLst>
-          </p:cNvPr>
-          <p:cNvSpPr>
-            <a:spLocks noGrp="1" noRot="1" noChangeAspect="1" noMove="1" noResize="1" noEditPoints="1" noAdjustHandles="1" noChangeArrowheads="1" noChangeShapeType="1" noTextEdit="1"/>
-          </p:cNvSpPr>
-          <p:nvPr>
-            <p:extLst>
-              <p:ext uri="{386F3935-93C4-4BCD-93E2-E3B085C9AB24}">
-                <p16:designElem xmlns:p16="http://schemas.microsoft.com/office/powerpoint/2015/main" val="1"/>
-              </p:ext>
-            </p:extLst>
-          </p:nvPr>
-        </p:nvSpPr>
-        <p:spPr>
-          <a:xfrm rot="2700000">
-            <a:off x="10262924" y="1465780"/>
-            <a:ext cx="1185708" cy="1185708"/>
-          </a:xfrm>
-          <a:prstGeom prst="rect">
-            <a:avLst/>
-          </a:prstGeom>
-          <a:solidFill>
-            <a:schemeClr val="accent1">
-              <a:alpha val="30000"/>
-            </a:schemeClr>
-          </a:solidFill>
-          <a:ln>
-            <a:noFill/>
-          </a:ln>
-        </p:spPr>
-        <p:style>
-          <a:lnRef idx="2">
-            <a:schemeClr val="accent1">
-              <a:shade val="50000"/>
-            </a:schemeClr>
-          </a:lnRef>
-          <a:fillRef idx="1">
-            <a:schemeClr val="accent1"/>
-          </a:fillRef>
-          <a:effectRef idx="0">
-            <a:schemeClr val="accent1"/>
-          </a:effectRef>
-          <a:fontRef idx="minor">
-            <a:schemeClr val="lt1"/>
-          </a:fontRef>
-        </p:style>
-        <p:txBody>
-          <a:bodyPr wrap="square" rtlCol="0" anchor="ctr">
-            <a:noAutofit/>
-          </a:bodyPr>
-          <a:lstStyle/>
-          <a:p>
-            <a:pPr algn="ctr"/>
-            <a:endParaRPr lang="en-US"/>
-          </a:p>
-        </p:txBody>
-      </p:sp>
-      <p:sp>
-        <p:nvSpPr>
-          <p:cNvPr id="20" name="Freeform: Shape 19">
-            <a:extLst>
-              <a:ext uri="{FF2B5EF4-FFF2-40B4-BE49-F238E27FC236}">
-                <a16:creationId xmlns:a16="http://schemas.microsoft.com/office/drawing/2014/main" id="{A3969E80-A77B-49FC-9122-D89AFD5EE118}"/>
-              </a:ext>
-              <a:ext uri="{C183D7F6-B498-43B3-948B-1728B52AA6E4}">
-                <adec:decorative xmlns:adec="http://schemas.microsoft.com/office/drawing/2017/decorative" val="1"/>
-              </a:ext>
-            </a:extLst>
-          </p:cNvPr>
-          <p:cNvSpPr>
-            <a:spLocks noGrp="1" noRot="1" noChangeAspect="1" noMove="1" noResize="1" noEditPoints="1" noAdjustHandles="1" noChangeArrowheads="1" noChangeShapeType="1" noTextEdit="1"/>
-          </p:cNvSpPr>
-          <p:nvPr>
-            <p:extLst>
-              <p:ext uri="{386F3935-93C4-4BCD-93E2-E3B085C9AB24}">
-                <p16:designElem xmlns:p16="http://schemas.microsoft.com/office/powerpoint/2015/main" val="1"/>
-              </p:ext>
-            </p:extLst>
-          </p:nvPr>
-        </p:nvSpPr>
-        <p:spPr>
-          <a:xfrm rot="2700000">
-            <a:off x="-29557" y="5198743"/>
-            <a:ext cx="2444907" cy="2366116"/>
-          </a:xfrm>
-          <a:custGeom>
-            <a:avLst/>
-            <a:gdLst>
-              <a:gd name="connsiteX0" fmla="*/ 0 w 2203753"/>
-              <a:gd name="connsiteY0" fmla="*/ 0 h 2132734"/>
-              <a:gd name="connsiteX1" fmla="*/ 2203753 w 2203753"/>
-              <a:gd name="connsiteY1" fmla="*/ 0 h 2132734"/>
-              <a:gd name="connsiteX2" fmla="*/ 2203753 w 2203753"/>
-              <a:gd name="connsiteY2" fmla="*/ 576461 h 2132734"/>
-              <a:gd name="connsiteX3" fmla="*/ 647480 w 2203753"/>
-              <a:gd name="connsiteY3" fmla="*/ 2132734 h 2132734"/>
-              <a:gd name="connsiteX4" fmla="*/ 0 w 2203753"/>
-              <a:gd name="connsiteY4" fmla="*/ 1485255 h 2132734"/>
-            </a:gdLst>
-            <a:ahLst/>
-            <a:cxnLst>
-              <a:cxn ang="0">
-                <a:pos x="connsiteX0" y="connsiteY0"/>
-              </a:cxn>
-              <a:cxn ang="0">
-                <a:pos x="connsiteX1" y="connsiteY1"/>
-              </a:cxn>
-              <a:cxn ang="0">
-                <a:pos x="connsiteX2" y="connsiteY2"/>
-              </a:cxn>
-              <a:cxn ang="0">
-                <a:pos x="connsiteX3" y="connsiteY3"/>
-              </a:cxn>
-              <a:cxn ang="0">
-                <a:pos x="connsiteX4" y="connsiteY4"/>
-              </a:cxn>
-            </a:cxnLst>
-            <a:rect l="l" t="t" r="r" b="b"/>
-            <a:pathLst>
-              <a:path w="2203753" h="2132734">
-                <a:moveTo>
-                  <a:pt x="0" y="0"/>
-                </a:moveTo>
-                <a:lnTo>
-                  <a:pt x="2203753" y="0"/>
-                </a:lnTo>
-                <a:lnTo>
-                  <a:pt x="2203753" y="576461"/>
-                </a:lnTo>
-                <a:lnTo>
-                  <a:pt x="647480" y="2132734"/>
-                </a:lnTo>
-                <a:lnTo>
-                  <a:pt x="0" y="1485255"/>
-                </a:lnTo>
-                <a:close/>
-              </a:path>
-            </a:pathLst>
-          </a:custGeom>
-          <a:solidFill>
-            <a:schemeClr val="accent1">
-              <a:alpha val="30000"/>
-            </a:schemeClr>
-          </a:solidFill>
-          <a:ln>
-            <a:noFill/>
-          </a:ln>
-        </p:spPr>
-        <p:style>
-          <a:lnRef idx="2">
-            <a:schemeClr val="accent1">
-              <a:shade val="50000"/>
-            </a:schemeClr>
-          </a:lnRef>
-          <a:fillRef idx="1">
-            <a:schemeClr val="accent1"/>
-          </a:fillRef>
-          <a:effectRef idx="0">
-            <a:schemeClr val="accent1"/>
-          </a:effectRef>
-          <a:fontRef idx="minor">
-            <a:schemeClr val="lt1"/>
-          </a:fontRef>
-        </p:style>
-        <p:txBody>
-          <a:bodyPr wrap="square" rtlCol="0" anchor="ctr">
-            <a:noAutofit/>
-          </a:bodyPr>
-          <a:lstStyle/>
-          <a:p>
-            <a:pPr algn="ctr"/>
-            <a:endParaRPr lang="en-US"/>
-          </a:p>
-        </p:txBody>
-      </p:sp>
-      <p:sp>
-        <p:nvSpPr>
-          <p:cNvPr id="22" name="Rectangle 21">
-            <a:extLst>
-              <a:ext uri="{FF2B5EF4-FFF2-40B4-BE49-F238E27FC236}">
-                <a16:creationId xmlns:a16="http://schemas.microsoft.com/office/drawing/2014/main" id="{1849CA57-76BD-4CF2-80BA-D7A46A01B7B1}"/>
-              </a:ext>
-              <a:ext uri="{C183D7F6-B498-43B3-948B-1728B52AA6E4}">
-                <adec:decorative xmlns:adec="http://schemas.microsoft.com/office/drawing/2017/decorative" val="1"/>
-              </a:ext>
-            </a:extLst>
-          </p:cNvPr>
-          <p:cNvSpPr>
-            <a:spLocks noGrp="1" noRot="1" noChangeAspect="1" noMove="1" noResize="1" noEditPoints="1" noAdjustHandles="1" noChangeArrowheads="1" noChangeShapeType="1" noTextEdit="1"/>
-          </p:cNvSpPr>
-          <p:nvPr>
-            <p:extLst>
-              <p:ext uri="{386F3935-93C4-4BCD-93E2-E3B085C9AB24}">
-                <p16:designElem xmlns:p16="http://schemas.microsoft.com/office/powerpoint/2015/main" val="1"/>
-              </p:ext>
-            </p:extLst>
-          </p:nvPr>
-        </p:nvSpPr>
-        <p:spPr>
-          <a:xfrm rot="2700000">
-            <a:off x="1769787" y="5439893"/>
-            <a:ext cx="928467" cy="928467"/>
-          </a:xfrm>
-          <a:prstGeom prst="rect">
-            <a:avLst/>
-          </a:prstGeom>
-          <a:solidFill>
-            <a:schemeClr val="accent1">
-              <a:alpha val="30000"/>
-            </a:schemeClr>
-          </a:solidFill>
-          <a:ln>
-            <a:noFill/>
-          </a:ln>
-        </p:spPr>
-        <p:style>
-          <a:lnRef idx="2">
-            <a:schemeClr val="accent1">
-              <a:shade val="50000"/>
-            </a:schemeClr>
-          </a:lnRef>
-          <a:fillRef idx="1">
-            <a:schemeClr val="accent1"/>
-          </a:fillRef>
-          <a:effectRef idx="0">
-            <a:schemeClr val="accent1"/>
-          </a:effectRef>
-          <a:fontRef idx="minor">
-            <a:schemeClr val="lt1"/>
-          </a:fontRef>
-        </p:style>
-        <p:txBody>
-          <a:bodyPr wrap="square" rtlCol="0" anchor="ctr">
-            <a:noAutofit/>
-          </a:bodyPr>
-          <a:lstStyle/>
-          <a:p>
-            <a:pPr algn="ctr"/>
-            <a:endParaRPr lang="en-US">
-              <a:solidFill>
-                <a:srgbClr val="FFFFFF"/>
-              </a:solidFill>
-              <a:effectLst>
-                <a:outerShdw blurRad="38100" dist="38100" dir="2700000" algn="tl">
-                  <a:srgbClr val="000000">
-                    <a:alpha val="43137"/>
-                  </a:srgbClr>
-                </a:outerShdw>
-              </a:effectLst>
-            </a:endParaRPr>
-          </a:p>
-        </p:txBody>
-      </p:sp>
-      <p:sp>
-        <p:nvSpPr>
-          <p:cNvPr id="24" name="Freeform: Shape 23">
-            <a:extLst>
-              <a:ext uri="{FF2B5EF4-FFF2-40B4-BE49-F238E27FC236}">
-                <a16:creationId xmlns:a16="http://schemas.microsoft.com/office/drawing/2014/main" id="{35E9085E-E730-4768-83D4-6CB7E9897153}"/>
-              </a:ext>
-              <a:ext uri="{C183D7F6-B498-43B3-948B-1728B52AA6E4}">
-                <adec:decorative xmlns:adec="http://schemas.microsoft.com/office/drawing/2017/decorative" val="1"/>
-              </a:ext>
-            </a:extLst>
-          </p:cNvPr>
-          <p:cNvSpPr>
-            <a:spLocks noGrp="1" noRot="1" noChangeAspect="1" noMove="1" noResize="1" noEditPoints="1" noAdjustHandles="1" noChangeArrowheads="1" noChangeShapeType="1" noTextEdit="1"/>
-          </p:cNvSpPr>
-          <p:nvPr>
-            <p:extLst>
-              <p:ext uri="{386F3935-93C4-4BCD-93E2-E3B085C9AB24}">
-                <p16:designElem xmlns:p16="http://schemas.microsoft.com/office/powerpoint/2015/main" val="1"/>
-              </p:ext>
-            </p:extLst>
-          </p:nvPr>
-        </p:nvSpPr>
-        <p:spPr>
-          <a:xfrm rot="2700000">
-            <a:off x="3401311" y="734311"/>
-            <a:ext cx="5389379" cy="5389379"/>
-          </a:xfrm>
-          <a:custGeom>
-            <a:avLst/>
-            <a:gdLst>
-              <a:gd name="connsiteX0" fmla="*/ 0 w 5389379"/>
-              <a:gd name="connsiteY0" fmla="*/ 540040 h 5389379"/>
-              <a:gd name="connsiteX1" fmla="*/ 540040 w 5389379"/>
-              <a:gd name="connsiteY1" fmla="*/ 0 h 5389379"/>
-              <a:gd name="connsiteX2" fmla="*/ 5389379 w 5389379"/>
-              <a:gd name="connsiteY2" fmla="*/ 0 h 5389379"/>
-              <a:gd name="connsiteX3" fmla="*/ 5389379 w 5389379"/>
-              <a:gd name="connsiteY3" fmla="*/ 4838655 h 5389379"/>
-              <a:gd name="connsiteX4" fmla="*/ 4838655 w 5389379"/>
-              <a:gd name="connsiteY4" fmla="*/ 5389379 h 5389379"/>
-              <a:gd name="connsiteX5" fmla="*/ 0 w 5389379"/>
-              <a:gd name="connsiteY5" fmla="*/ 5389379 h 5389379"/>
-            </a:gdLst>
-            <a:ahLst/>
-            <a:cxnLst>
-              <a:cxn ang="0">
-                <a:pos x="connsiteX0" y="connsiteY0"/>
-              </a:cxn>
-              <a:cxn ang="0">
-                <a:pos x="connsiteX1" y="connsiteY1"/>
-              </a:cxn>
-              <a:cxn ang="0">
-                <a:pos x="connsiteX2" y="connsiteY2"/>
-              </a:cxn>
-              <a:cxn ang="0">
-                <a:pos x="connsiteX3" y="connsiteY3"/>
-              </a:cxn>
-              <a:cxn ang="0">
-                <a:pos x="connsiteX4" y="connsiteY4"/>
-              </a:cxn>
-              <a:cxn ang="0">
-                <a:pos x="connsiteX5" y="connsiteY5"/>
-              </a:cxn>
-            </a:cxnLst>
-            <a:rect l="l" t="t" r="r" b="b"/>
-            <a:pathLst>
-              <a:path w="5389379" h="5389379">
-                <a:moveTo>
-                  <a:pt x="0" y="540040"/>
-                </a:moveTo>
-                <a:lnTo>
-                  <a:pt x="540040" y="0"/>
-                </a:lnTo>
-                <a:lnTo>
-                  <a:pt x="5389379" y="0"/>
-                </a:lnTo>
-                <a:lnTo>
-                  <a:pt x="5389379" y="4838655"/>
-                </a:lnTo>
-                <a:lnTo>
-                  <a:pt x="4838655" y="5389379"/>
-                </a:lnTo>
-                <a:lnTo>
-                  <a:pt x="0" y="5389379"/>
-                </a:lnTo>
-                <a:close/>
-              </a:path>
-            </a:pathLst>
-          </a:custGeom>
-          <a:solidFill>
-            <a:srgbClr val="FFFFFF"/>
-          </a:solidFill>
-          <a:ln>
-            <a:noFill/>
-          </a:ln>
-        </p:spPr>
-        <p:style>
-          <a:lnRef idx="2">
-            <a:schemeClr val="accent1">
-              <a:shade val="50000"/>
-            </a:schemeClr>
-          </a:lnRef>
-          <a:fillRef idx="1">
-            <a:schemeClr val="accent1"/>
-          </a:fillRef>
-          <a:effectRef idx="0">
-            <a:schemeClr val="accent1"/>
-          </a:effectRef>
-          <a:fontRef idx="minor">
-            <a:schemeClr val="lt1"/>
-          </a:fontRef>
-        </p:style>
-        <p:txBody>
-          <a:bodyPr wrap="square" rtlCol="0" anchor="ctr">
-            <a:noAutofit/>
-          </a:bodyPr>
-          <a:lstStyle/>
-          <a:p>
-            <a:pPr algn="ctr"/>
-            <a:endParaRPr lang="en-US"/>
-          </a:p>
-        </p:txBody>
-      </p:sp>
-      <p:sp>
-        <p:nvSpPr>
-          <p:cNvPr id="26" name="Freeform: Shape 25">
-            <a:extLst>
-              <a:ext uri="{FF2B5EF4-FFF2-40B4-BE49-F238E27FC236}">
-                <a16:creationId xmlns:a16="http://schemas.microsoft.com/office/drawing/2014/main" id="{973272FE-A474-4CAE-8CA2-BCC8B476C3F4}"/>
-              </a:ext>
-              <a:ext uri="{C183D7F6-B498-43B3-948B-1728B52AA6E4}">
-                <adec:decorative xmlns:adec="http://schemas.microsoft.com/office/drawing/2017/decorative" val="1"/>
-              </a:ext>
-            </a:extLst>
-          </p:cNvPr>
-          <p:cNvSpPr>
-            <a:spLocks noGrp="1" noRot="1" noChangeAspect="1" noMove="1" noResize="1" noEditPoints="1" noAdjustHandles="1" noChangeArrowheads="1" noChangeShapeType="1" noTextEdit="1"/>
-          </p:cNvSpPr>
-          <p:nvPr>
-            <p:extLst>
-              <p:ext uri="{386F3935-93C4-4BCD-93E2-E3B085C9AB24}">
-                <p16:designElem xmlns:p16="http://schemas.microsoft.com/office/powerpoint/2015/main" val="1"/>
-              </p:ext>
-            </p:extLst>
-          </p:nvPr>
-        </p:nvSpPr>
-        <p:spPr>
-          <a:xfrm rot="2700000">
-            <a:off x="2700283" y="33283"/>
-            <a:ext cx="6791435" cy="6791435"/>
-          </a:xfrm>
-          <a:custGeom>
-            <a:avLst/>
-            <a:gdLst>
-              <a:gd name="connsiteX0" fmla="*/ 1860938 w 6791435"/>
-              <a:gd name="connsiteY0" fmla="*/ 81158 h 6791435"/>
-              <a:gd name="connsiteX1" fmla="*/ 1942096 w 6791435"/>
-              <a:gd name="connsiteY1" fmla="*/ 0 h 6791435"/>
-              <a:gd name="connsiteX2" fmla="*/ 6791435 w 6791435"/>
-              <a:gd name="connsiteY2" fmla="*/ 0 h 6791435"/>
-              <a:gd name="connsiteX3" fmla="*/ 6791435 w 6791435"/>
-              <a:gd name="connsiteY3" fmla="*/ 4838655 h 6791435"/>
-              <a:gd name="connsiteX4" fmla="*/ 6710277 w 6791435"/>
-              <a:gd name="connsiteY4" fmla="*/ 4919813 h 6791435"/>
-              <a:gd name="connsiteX5" fmla="*/ 6710277 w 6791435"/>
-              <a:gd name="connsiteY5" fmla="*/ 81158 h 6791435"/>
-              <a:gd name="connsiteX6" fmla="*/ 0 w 6791435"/>
-              <a:gd name="connsiteY6" fmla="*/ 1942096 h 6791435"/>
-              <a:gd name="connsiteX7" fmla="*/ 81158 w 6791435"/>
-              <a:gd name="connsiteY7" fmla="*/ 1860938 h 6791435"/>
-              <a:gd name="connsiteX8" fmla="*/ 81158 w 6791435"/>
-              <a:gd name="connsiteY8" fmla="*/ 6710277 h 6791435"/>
-              <a:gd name="connsiteX9" fmla="*/ 4919813 w 6791435"/>
-              <a:gd name="connsiteY9" fmla="*/ 6710277 h 6791435"/>
-              <a:gd name="connsiteX10" fmla="*/ 4838655 w 6791435"/>
-              <a:gd name="connsiteY10" fmla="*/ 6791435 h 6791435"/>
-              <a:gd name="connsiteX11" fmla="*/ 0 w 6791435"/>
-              <a:gd name="connsiteY11" fmla="*/ 6791435 h 6791435"/>
-            </a:gdLst>
-            <a:ahLst/>
-            <a:cxnLst>
-              <a:cxn ang="0">
-                <a:pos x="connsiteX0" y="connsiteY0"/>
-              </a:cxn>
-              <a:cxn ang="0">
-                <a:pos x="connsiteX1" y="connsiteY1"/>
-              </a:cxn>
-              <a:cxn ang="0">
-                <a:pos x="connsiteX2" y="connsiteY2"/>
-              </a:cxn>
-              <a:cxn ang="0">
-                <a:pos x="connsiteX3" y="connsiteY3"/>
-              </a:cxn>
-              <a:cxn ang="0">
-                <a:pos x="connsiteX4" y="connsiteY4"/>
-              </a:cxn>
-              <a:cxn ang="0">
-                <a:pos x="connsiteX5" y="connsiteY5"/>
-              </a:cxn>
-              <a:cxn ang="0">
-                <a:pos x="connsiteX6" y="connsiteY6"/>
-              </a:cxn>
-              <a:cxn ang="0">
-                <a:pos x="connsiteX7" y="connsiteY7"/>
-              </a:cxn>
-              <a:cxn ang="0">
-                <a:pos x="connsiteX8" y="connsiteY8"/>
-              </a:cxn>
-              <a:cxn ang="0">
-                <a:pos x="connsiteX9" y="connsiteY9"/>
-              </a:cxn>
-              <a:cxn ang="0">
-                <a:pos x="connsiteX10" y="connsiteY10"/>
-              </a:cxn>
-              <a:cxn ang="0">
-                <a:pos x="connsiteX11" y="connsiteY11"/>
-              </a:cxn>
-            </a:cxnLst>
-            <a:rect l="l" t="t" r="r" b="b"/>
-            <a:pathLst>
-              <a:path w="6791435" h="6791435">
-                <a:moveTo>
-                  <a:pt x="1860938" y="81158"/>
-                </a:moveTo>
-                <a:lnTo>
-                  <a:pt x="1942096" y="0"/>
-                </a:lnTo>
-                <a:lnTo>
-                  <a:pt x="6791435" y="0"/>
-                </a:lnTo>
-                <a:lnTo>
-                  <a:pt x="6791435" y="4838655"/>
-                </a:lnTo>
-                <a:lnTo>
-                  <a:pt x="6710277" y="4919813"/>
-                </a:lnTo>
-                <a:lnTo>
-                  <a:pt x="6710277" y="81158"/>
-                </a:lnTo>
-                <a:close/>
-                <a:moveTo>
-                  <a:pt x="0" y="1942096"/>
-                </a:moveTo>
-                <a:lnTo>
-                  <a:pt x="81158" y="1860938"/>
-                </a:lnTo>
-                <a:lnTo>
-                  <a:pt x="81158" y="6710277"/>
-                </a:lnTo>
-                <a:lnTo>
-                  <a:pt x="4919813" y="6710277"/>
-                </a:lnTo>
-                <a:lnTo>
-                  <a:pt x="4838655" y="6791435"/>
-                </a:lnTo>
-                <a:lnTo>
-                  <a:pt x="0" y="6791435"/>
-                </a:lnTo>
-                <a:close/>
-              </a:path>
-            </a:pathLst>
-          </a:custGeom>
-          <a:solidFill>
-            <a:srgbClr val="FFFFFF">
-              <a:alpha val="60000"/>
-            </a:srgbClr>
-          </a:solidFill>
-          <a:ln>
-            <a:noFill/>
-          </a:ln>
-        </p:spPr>
-        <p:style>
-          <a:lnRef idx="2">
-            <a:schemeClr val="accent1">
-              <a:shade val="50000"/>
-            </a:schemeClr>
-          </a:lnRef>
-          <a:fillRef idx="1">
-            <a:schemeClr val="accent1"/>
-          </a:fillRef>
-          <a:effectRef idx="0">
-            <a:schemeClr val="accent1"/>
-          </a:effectRef>
-          <a:fontRef idx="minor">
-            <a:schemeClr val="lt1"/>
-          </a:fontRef>
-        </p:style>
-        <p:txBody>
-          <a:bodyPr wrap="square" rtlCol="0" anchor="ctr">
-            <a:noAutofit/>
-          </a:bodyPr>
-          <a:lstStyle/>
-          <a:p>
-            <a:pPr algn="ctr"/>
-            <a:endParaRPr lang="en-US">
-              <a:solidFill>
-                <a:schemeClr val="tx1"/>
-              </a:solidFill>
-            </a:endParaRPr>
-          </a:p>
-        </p:txBody>
-      </p:sp>
-      <p:sp>
-        <p:nvSpPr>
-          <p:cNvPr id="5" name="Text Placeholder 4">
-            <a:extLst>
-              <a:ext uri="{FF2B5EF4-FFF2-40B4-BE49-F238E27FC236}">
-                <a16:creationId xmlns:a16="http://schemas.microsoft.com/office/drawing/2014/main" id="{671B232E-836A-4E7A-852B-D842CEF5A7FA}"/>
-              </a:ext>
-            </a:extLst>
-          </p:cNvPr>
-          <p:cNvSpPr>
-            <a:spLocks noGrp="1"/>
-          </p:cNvSpPr>
-          <p:nvPr>
-            <p:ph type="body" idx="1"/>
-          </p:nvPr>
-        </p:nvSpPr>
-        <p:spPr>
-          <a:xfrm>
-            <a:off x="4439633" y="4518923"/>
-            <a:ext cx="3312734" cy="1141851"/>
-          </a:xfrm>
-          <a:noFill/>
-        </p:spPr>
-        <p:txBody>
-          <a:bodyPr vert="horz" lIns="91440" tIns="45720" rIns="91440" bIns="45720" rtlCol="0">
-            <a:normAutofit/>
-          </a:bodyPr>
-          <a:lstStyle/>
-          <a:p>
-            <a:pPr algn="ctr"/>
-            <a:endParaRPr lang="en-US" sz="2000" kern="1200">
-              <a:solidFill>
-                <a:srgbClr val="080808"/>
-              </a:solidFill>
-              <a:latin typeface="+mn-lt"/>
-              <a:ea typeface="+mn-ea"/>
-              <a:cs typeface="+mn-cs"/>
-            </a:endParaRPr>
-          </a:p>
-        </p:txBody>
-      </p:sp>
-      <p:sp>
-        <p:nvSpPr>
-          <p:cNvPr id="4" name="Title 3">
-            <a:extLst>
-              <a:ext uri="{FF2B5EF4-FFF2-40B4-BE49-F238E27FC236}">
-                <a16:creationId xmlns:a16="http://schemas.microsoft.com/office/drawing/2014/main" id="{32630932-93E8-48AE-AD4C-2EC5BC72BE46}"/>
-              </a:ext>
-            </a:extLst>
-          </p:cNvPr>
-          <p:cNvSpPr>
-            <a:spLocks noGrp="1"/>
-          </p:cNvSpPr>
-          <p:nvPr>
-            <p:ph type="title"/>
-          </p:nvPr>
-        </p:nvSpPr>
-        <p:spPr>
-          <a:xfrm>
-            <a:off x="3204642" y="2353641"/>
-            <a:ext cx="5782716" cy="2150719"/>
-          </a:xfrm>
-          <a:noFill/>
-        </p:spPr>
-        <p:txBody>
-          <a:bodyPr vert="horz" lIns="91440" tIns="45720" rIns="91440" bIns="45720" rtlCol="0" anchor="ctr">
-            <a:normAutofit/>
-          </a:bodyPr>
-          <a:lstStyle/>
-          <a:p>
-            <a:pPr algn="ctr"/>
-            <a:r>
-              <a:rPr lang="en-US" sz="3600" kern="1200" dirty="0">
-                <a:solidFill>
-                  <a:srgbClr val="080808"/>
-                </a:solidFill>
-                <a:latin typeface="+mj-lt"/>
-                <a:ea typeface="+mj-ea"/>
-                <a:cs typeface="+mj-cs"/>
-              </a:rPr>
-              <a:t>Computer Vision</a:t>
-            </a:r>
-          </a:p>
-        </p:txBody>
-      </p:sp>
-      <p:sp>
-        <p:nvSpPr>
-          <p:cNvPr id="28" name="Freeform: Shape 27">
-            <a:extLst>
-              <a:ext uri="{FF2B5EF4-FFF2-40B4-BE49-F238E27FC236}">
-                <a16:creationId xmlns:a16="http://schemas.microsoft.com/office/drawing/2014/main" id="{E07981EA-05A6-437C-88D7-B377B92B031D}"/>
-              </a:ext>
-              <a:ext uri="{C183D7F6-B498-43B3-948B-1728B52AA6E4}">
-                <adec:decorative xmlns:adec="http://schemas.microsoft.com/office/drawing/2017/decorative" val="1"/>
-              </a:ext>
-            </a:extLst>
-          </p:cNvPr>
-          <p:cNvSpPr>
-            <a:spLocks noGrp="1" noRot="1" noChangeAspect="1" noMove="1" noResize="1" noEditPoints="1" noAdjustHandles="1" noChangeArrowheads="1" noChangeShapeType="1" noTextEdit="1"/>
-          </p:cNvSpPr>
-          <p:nvPr>
-            <p:extLst>
-              <p:ext uri="{386F3935-93C4-4BCD-93E2-E3B085C9AB24}">
-                <p16:designElem xmlns:p16="http://schemas.microsoft.com/office/powerpoint/2015/main" val="1"/>
-              </p:ext>
-            </p:extLst>
-          </p:nvPr>
-        </p:nvSpPr>
-        <p:spPr>
-          <a:xfrm rot="2700000">
-            <a:off x="9629823" y="5457591"/>
-            <a:ext cx="2231794" cy="2568811"/>
-          </a:xfrm>
-          <a:custGeom>
-            <a:avLst/>
-            <a:gdLst>
-              <a:gd name="connsiteX0" fmla="*/ 0 w 2940086"/>
-              <a:gd name="connsiteY0" fmla="*/ 0 h 3384061"/>
-              <a:gd name="connsiteX1" fmla="*/ 2496112 w 2940086"/>
-              <a:gd name="connsiteY1" fmla="*/ 0 h 3384061"/>
-              <a:gd name="connsiteX2" fmla="*/ 2940086 w 2940086"/>
-              <a:gd name="connsiteY2" fmla="*/ 443975 h 3384061"/>
-              <a:gd name="connsiteX3" fmla="*/ 0 w 2940086"/>
-              <a:gd name="connsiteY3" fmla="*/ 3384061 h 3384061"/>
-            </a:gdLst>
-            <a:ahLst/>
-            <a:cxnLst>
-              <a:cxn ang="0">
-                <a:pos x="connsiteX0" y="connsiteY0"/>
-              </a:cxn>
-              <a:cxn ang="0">
-                <a:pos x="connsiteX1" y="connsiteY1"/>
-              </a:cxn>
-              <a:cxn ang="0">
-                <a:pos x="connsiteX2" y="connsiteY2"/>
-              </a:cxn>
-              <a:cxn ang="0">
-                <a:pos x="connsiteX3" y="connsiteY3"/>
-              </a:cxn>
-            </a:cxnLst>
-            <a:rect l="l" t="t" r="r" b="b"/>
-            <a:pathLst>
-              <a:path w="2940086" h="3384061">
-                <a:moveTo>
-                  <a:pt x="0" y="0"/>
-                </a:moveTo>
-                <a:lnTo>
-                  <a:pt x="2496112" y="0"/>
-                </a:lnTo>
-                <a:lnTo>
-                  <a:pt x="2940086" y="443975"/>
-                </a:lnTo>
-                <a:lnTo>
-                  <a:pt x="0" y="3384061"/>
-                </a:lnTo>
-                <a:close/>
-              </a:path>
-            </a:pathLst>
-          </a:custGeom>
-          <a:solidFill>
-            <a:schemeClr val="accent4">
-              <a:alpha val="40000"/>
-            </a:schemeClr>
-          </a:solidFill>
-          <a:ln>
-            <a:noFill/>
-          </a:ln>
-        </p:spPr>
-        <p:style>
-          <a:lnRef idx="2">
-            <a:schemeClr val="accent1">
-              <a:shade val="50000"/>
-            </a:schemeClr>
-          </a:lnRef>
-          <a:fillRef idx="1">
-            <a:schemeClr val="accent1"/>
-          </a:fillRef>
-          <a:effectRef idx="0">
-            <a:schemeClr val="accent1"/>
-          </a:effectRef>
-          <a:fontRef idx="minor">
-            <a:schemeClr val="lt1"/>
-          </a:fontRef>
-        </p:style>
-        <p:txBody>
-          <a:bodyPr wrap="square" rtlCol="0" anchor="ctr">
-            <a:noAutofit/>
-          </a:bodyPr>
-          <a:lstStyle/>
-          <a:p>
-            <a:pPr algn="ctr"/>
-            <a:endParaRPr lang="en-US"/>
-          </a:p>
-        </p:txBody>
-      </p:sp>
-      <p:sp>
-        <p:nvSpPr>
-          <p:cNvPr id="30" name="Rectangle 29">
-            <a:extLst>
-              <a:ext uri="{FF2B5EF4-FFF2-40B4-BE49-F238E27FC236}">
-                <a16:creationId xmlns:a16="http://schemas.microsoft.com/office/drawing/2014/main" id="{15E3C750-986E-4769-B1AE-49289FBEE757}"/>
-              </a:ext>
-              <a:ext uri="{C183D7F6-B498-43B3-948B-1728B52AA6E4}">
-                <adec:decorative xmlns:adec="http://schemas.microsoft.com/office/drawing/2017/decorative" val="1"/>
-              </a:ext>
-            </a:extLst>
-          </p:cNvPr>
-          <p:cNvSpPr>
-            <a:spLocks noGrp="1" noRot="1" noChangeAspect="1" noMove="1" noResize="1" noEditPoints="1" noAdjustHandles="1" noChangeArrowheads="1" noChangeShapeType="1" noTextEdit="1"/>
-          </p:cNvSpPr>
-          <p:nvPr>
-            <p:extLst>
-              <p:ext uri="{386F3935-93C4-4BCD-93E2-E3B085C9AB24}">
-                <p16:designElem xmlns:p16="http://schemas.microsoft.com/office/powerpoint/2015/main" val="1"/>
-              </p:ext>
-            </p:extLst>
-          </p:nvPr>
-        </p:nvSpPr>
-        <p:spPr>
-          <a:xfrm rot="2700000">
-            <a:off x="9720059" y="5243545"/>
-            <a:ext cx="959985" cy="959985"/>
-          </a:xfrm>
-          <a:prstGeom prst="rect">
-            <a:avLst/>
-          </a:prstGeom>
-          <a:solidFill>
-            <a:schemeClr val="accent4">
-              <a:alpha val="40000"/>
-            </a:schemeClr>
-          </a:solidFill>
-          <a:ln>
-            <a:noFill/>
-          </a:ln>
-        </p:spPr>
-        <p:style>
-          <a:lnRef idx="2">
-            <a:schemeClr val="accent1">
-              <a:shade val="50000"/>
-            </a:schemeClr>
-          </a:lnRef>
-          <a:fillRef idx="1">
-            <a:schemeClr val="accent1"/>
-          </a:fillRef>
-          <a:effectRef idx="0">
-            <a:schemeClr val="accent1"/>
-          </a:effectRef>
-          <a:fontRef idx="minor">
-            <a:schemeClr val="lt1"/>
-          </a:fontRef>
-        </p:style>
-        <p:txBody>
-          <a:bodyPr wrap="square" rtlCol="0" anchor="ctr">
-            <a:noAutofit/>
-          </a:bodyPr>
-          <a:lstStyle/>
-          <a:p>
-            <a:pPr algn="ctr"/>
-            <a:endParaRPr lang="en-US"/>
-          </a:p>
-        </p:txBody>
-      </p:sp>
-    </p:spTree>
-    <p:extLst>
-      <p:ext uri="{BB962C8B-B14F-4D97-AF65-F5344CB8AC3E}">
-        <p14:creationId xmlns:p14="http://schemas.microsoft.com/office/powerpoint/2010/main" val="3647563204"/>
       </p:ext>
     </p:extLst>
   </p:cSld>

</xml_diff>